<commit_message>
Final Presentation slides updated
</commit_message>
<xml_diff>
--- a/Advanced Embedded systems/Final presentation/Advanced Embedded Systems_Team Exemplary.pptx
+++ b/Advanced Embedded systems/Final presentation/Advanced Embedded Systems_Team Exemplary.pptx
@@ -838,7 +838,7 @@
   <p:cSld>
     <p:spTree>
       <p:nvGrpSpPr>
-        <p:cNvPr id="169" name="Shape 169"/>
+        <p:cNvPr id="170" name="Shape 170"/>
         <p:cNvGrpSpPr/>
         <p:nvPr/>
       </p:nvGrpSpPr>
@@ -852,7 +852,7 @@
       </p:grpSpPr>
       <p:sp>
         <p:nvSpPr>
-          <p:cNvPr id="170" name="Google Shape;170;g13a8149c2c0_3_156:notes"/>
+          <p:cNvPr id="171" name="Google Shape;171;g13a8149c2c0_3_156:notes"/>
           <p:cNvSpPr/>
           <p:nvPr>
             <p:ph idx="2" type="sldImg"/>
@@ -887,7 +887,7 @@
       </p:sp>
       <p:sp>
         <p:nvSpPr>
-          <p:cNvPr id="171" name="Google Shape;171;g13a8149c2c0_3_156:notes"/>
+          <p:cNvPr id="172" name="Google Shape;172;g13a8149c2c0_3_156:notes"/>
           <p:cNvSpPr txBox="1"/>
           <p:nvPr>
             <p:ph idx="1" type="body"/>
@@ -937,7 +937,7 @@
   <p:cSld>
     <p:spTree>
       <p:nvGrpSpPr>
-        <p:cNvPr id="176" name="Shape 176"/>
+        <p:cNvPr id="177" name="Shape 177"/>
         <p:cNvGrpSpPr/>
         <p:nvPr/>
       </p:nvGrpSpPr>
@@ -951,7 +951,7 @@
       </p:grpSpPr>
       <p:sp>
         <p:nvSpPr>
-          <p:cNvPr id="177" name="Google Shape;177;g13650905f48_0_25:notes"/>
+          <p:cNvPr id="178" name="Google Shape;178;g13650905f48_0_25:notes"/>
           <p:cNvSpPr/>
           <p:nvPr>
             <p:ph idx="2" type="sldImg"/>
@@ -986,7 +986,7 @@
       </p:sp>
       <p:sp>
         <p:nvSpPr>
-          <p:cNvPr id="178" name="Google Shape;178;g13650905f48_0_25:notes"/>
+          <p:cNvPr id="179" name="Google Shape;179;g13650905f48_0_25:notes"/>
           <p:cNvSpPr txBox="1"/>
           <p:nvPr>
             <p:ph idx="1" type="body"/>
@@ -1036,7 +1036,7 @@
   <p:cSld>
     <p:spTree>
       <p:nvGrpSpPr>
-        <p:cNvPr id="184" name="Shape 184"/>
+        <p:cNvPr id="185" name="Shape 185"/>
         <p:cNvGrpSpPr/>
         <p:nvPr/>
       </p:nvGrpSpPr>
@@ -1050,7 +1050,7 @@
       </p:grpSpPr>
       <p:sp>
         <p:nvSpPr>
-          <p:cNvPr id="185" name="Google Shape;185;g135b9a59cea_0_2:notes"/>
+          <p:cNvPr id="186" name="Google Shape;186;g135b9a59cea_0_2:notes"/>
           <p:cNvSpPr/>
           <p:nvPr>
             <p:ph idx="2" type="sldImg"/>
@@ -1085,7 +1085,7 @@
       </p:sp>
       <p:sp>
         <p:nvSpPr>
-          <p:cNvPr id="186" name="Google Shape;186;g135b9a59cea_0_2:notes"/>
+          <p:cNvPr id="187" name="Google Shape;187;g135b9a59cea_0_2:notes"/>
           <p:cNvSpPr txBox="1"/>
           <p:nvPr>
             <p:ph idx="1" type="body"/>
@@ -1135,7 +1135,7 @@
   <p:cSld>
     <p:spTree>
       <p:nvGrpSpPr>
-        <p:cNvPr id="198" name="Shape 198"/>
+        <p:cNvPr id="199" name="Shape 199"/>
         <p:cNvGrpSpPr/>
         <p:nvPr/>
       </p:nvGrpSpPr>
@@ -1149,7 +1149,7 @@
       </p:grpSpPr>
       <p:sp>
         <p:nvSpPr>
-          <p:cNvPr id="199" name="Google Shape;199;g13a8149c2c0_2_11:notes"/>
+          <p:cNvPr id="200" name="Google Shape;200;g13a8149c2c0_2_11:notes"/>
           <p:cNvSpPr/>
           <p:nvPr>
             <p:ph idx="2" type="sldImg"/>
@@ -1184,7 +1184,7 @@
       </p:sp>
       <p:sp>
         <p:nvSpPr>
-          <p:cNvPr id="200" name="Google Shape;200;g13a8149c2c0_2_11:notes"/>
+          <p:cNvPr id="201" name="Google Shape;201;g13a8149c2c0_2_11:notes"/>
           <p:cNvSpPr txBox="1"/>
           <p:nvPr>
             <p:ph idx="1" type="body"/>
@@ -1234,7 +1234,7 @@
   <p:cSld>
     <p:spTree>
       <p:nvGrpSpPr>
-        <p:cNvPr id="205" name="Shape 205"/>
+        <p:cNvPr id="206" name="Shape 206"/>
         <p:cNvGrpSpPr/>
         <p:nvPr/>
       </p:nvGrpSpPr>
@@ -1248,7 +1248,7 @@
       </p:grpSpPr>
       <p:sp>
         <p:nvSpPr>
-          <p:cNvPr id="206" name="Google Shape;206;g13a8149c2c0_0_10:notes"/>
+          <p:cNvPr id="207" name="Google Shape;207;g13a8149c2c0_0_10:notes"/>
           <p:cNvSpPr/>
           <p:nvPr>
             <p:ph idx="2" type="sldImg"/>
@@ -1283,7 +1283,7 @@
       </p:sp>
       <p:sp>
         <p:nvSpPr>
-          <p:cNvPr id="207" name="Google Shape;207;g13a8149c2c0_0_10:notes"/>
+          <p:cNvPr id="208" name="Google Shape;208;g13a8149c2c0_0_10:notes"/>
           <p:cNvSpPr txBox="1"/>
           <p:nvPr>
             <p:ph idx="1" type="body"/>
@@ -1333,7 +1333,7 @@
   <p:cSld>
     <p:spTree>
       <p:nvGrpSpPr>
-        <p:cNvPr id="212" name="Shape 212"/>
+        <p:cNvPr id="213" name="Shape 213"/>
         <p:cNvGrpSpPr/>
         <p:nvPr/>
       </p:nvGrpSpPr>
@@ -1347,7 +1347,7 @@
       </p:grpSpPr>
       <p:sp>
         <p:nvSpPr>
-          <p:cNvPr id="213" name="Google Shape;213;g13a8149c2c0_2_19:notes"/>
+          <p:cNvPr id="214" name="Google Shape;214;g13a8149c2c0_2_19:notes"/>
           <p:cNvSpPr/>
           <p:nvPr>
             <p:ph idx="2" type="sldImg"/>
@@ -1382,7 +1382,7 @@
       </p:sp>
       <p:sp>
         <p:nvSpPr>
-          <p:cNvPr id="214" name="Google Shape;214;g13a8149c2c0_2_19:notes"/>
+          <p:cNvPr id="215" name="Google Shape;215;g13a8149c2c0_2_19:notes"/>
           <p:cNvSpPr txBox="1"/>
           <p:nvPr>
             <p:ph idx="1" type="body"/>
@@ -1432,7 +1432,7 @@
   <p:cSld>
     <p:spTree>
       <p:nvGrpSpPr>
-        <p:cNvPr id="219" name="Shape 219"/>
+        <p:cNvPr id="220" name="Shape 220"/>
         <p:cNvGrpSpPr/>
         <p:nvPr/>
       </p:nvGrpSpPr>
@@ -1446,7 +1446,7 @@
       </p:grpSpPr>
       <p:sp>
         <p:nvSpPr>
-          <p:cNvPr id="220" name="Google Shape;220;g13a8149c2c0_2_24:notes"/>
+          <p:cNvPr id="221" name="Google Shape;221;g13a8149c2c0_2_24:notes"/>
           <p:cNvSpPr/>
           <p:nvPr>
             <p:ph idx="2" type="sldImg"/>
@@ -1481,7 +1481,7 @@
       </p:sp>
       <p:sp>
         <p:nvSpPr>
-          <p:cNvPr id="221" name="Google Shape;221;g13a8149c2c0_2_24:notes"/>
+          <p:cNvPr id="222" name="Google Shape;222;g13a8149c2c0_2_24:notes"/>
           <p:cNvSpPr txBox="1"/>
           <p:nvPr>
             <p:ph idx="1" type="body"/>
@@ -1531,7 +1531,7 @@
   <p:cSld>
     <p:spTree>
       <p:nvGrpSpPr>
-        <p:cNvPr id="226" name="Shape 226"/>
+        <p:cNvPr id="227" name="Shape 227"/>
         <p:cNvGrpSpPr/>
         <p:nvPr/>
       </p:nvGrpSpPr>
@@ -1545,7 +1545,7 @@
       </p:grpSpPr>
       <p:sp>
         <p:nvSpPr>
-          <p:cNvPr id="227" name="Google Shape;227;g13a8149c2c0_3_16:notes"/>
+          <p:cNvPr id="228" name="Google Shape;228;g13a8149c2c0_3_16:notes"/>
           <p:cNvSpPr/>
           <p:nvPr>
             <p:ph idx="2" type="sldImg"/>
@@ -1580,7 +1580,7 @@
       </p:sp>
       <p:sp>
         <p:nvSpPr>
-          <p:cNvPr id="228" name="Google Shape;228;g13a8149c2c0_3_16:notes"/>
+          <p:cNvPr id="229" name="Google Shape;229;g13a8149c2c0_3_16:notes"/>
           <p:cNvSpPr txBox="1"/>
           <p:nvPr>
             <p:ph idx="1" type="body"/>
@@ -1630,7 +1630,7 @@
   <p:cSld>
     <p:spTree>
       <p:nvGrpSpPr>
-        <p:cNvPr id="233" name="Shape 233"/>
+        <p:cNvPr id="234" name="Shape 234"/>
         <p:cNvGrpSpPr/>
         <p:nvPr/>
       </p:nvGrpSpPr>
@@ -1644,7 +1644,7 @@
       </p:grpSpPr>
       <p:sp>
         <p:nvSpPr>
-          <p:cNvPr id="234" name="Google Shape;234;g13650905f48_0_34:notes"/>
+          <p:cNvPr id="235" name="Google Shape;235;g13650905f48_0_34:notes"/>
           <p:cNvSpPr/>
           <p:nvPr>
             <p:ph idx="2" type="sldImg"/>
@@ -1679,7 +1679,7 @@
       </p:sp>
       <p:sp>
         <p:nvSpPr>
-          <p:cNvPr id="235" name="Google Shape;235;g13650905f48_0_34:notes"/>
+          <p:cNvPr id="236" name="Google Shape;236;g13650905f48_0_34:notes"/>
           <p:cNvSpPr txBox="1"/>
           <p:nvPr>
             <p:ph idx="1" type="body"/>
@@ -1729,7 +1729,7 @@
   <p:cSld>
     <p:spTree>
       <p:nvGrpSpPr>
-        <p:cNvPr id="240" name="Shape 240"/>
+        <p:cNvPr id="241" name="Shape 241"/>
         <p:cNvGrpSpPr/>
         <p:nvPr/>
       </p:nvGrpSpPr>
@@ -1743,7 +1743,7 @@
       </p:grpSpPr>
       <p:sp>
         <p:nvSpPr>
-          <p:cNvPr id="241" name="Google Shape;241;g13650905f48_0_15:notes"/>
+          <p:cNvPr id="242" name="Google Shape;242;g13650905f48_0_15:notes"/>
           <p:cNvSpPr/>
           <p:nvPr>
             <p:ph idx="2" type="sldImg"/>
@@ -1778,7 +1778,7 @@
       </p:sp>
       <p:sp>
         <p:nvSpPr>
-          <p:cNvPr id="242" name="Google Shape;242;g13650905f48_0_15:notes"/>
+          <p:cNvPr id="243" name="Google Shape;243;g13650905f48_0_15:notes"/>
           <p:cNvSpPr txBox="1"/>
           <p:nvPr>
             <p:ph idx="1" type="body"/>
@@ -1828,7 +1828,7 @@
   <p:cSld>
     <p:spTree>
       <p:nvGrpSpPr>
-        <p:cNvPr id="90" name="Shape 90"/>
+        <p:cNvPr id="91" name="Shape 91"/>
         <p:cNvGrpSpPr/>
         <p:nvPr/>
       </p:nvGrpSpPr>
@@ -1842,7 +1842,7 @@
       </p:grpSpPr>
       <p:sp>
         <p:nvSpPr>
-          <p:cNvPr id="91" name="Google Shape;91;g13a8149c2c0_2_0:notes"/>
+          <p:cNvPr id="92" name="Google Shape;92;g13a8149c2c0_2_0:notes"/>
           <p:cNvSpPr/>
           <p:nvPr>
             <p:ph idx="2" type="sldImg"/>
@@ -1877,7 +1877,7 @@
       </p:sp>
       <p:sp>
         <p:nvSpPr>
-          <p:cNvPr id="92" name="Google Shape;92;g13a8149c2c0_2_0:notes"/>
+          <p:cNvPr id="93" name="Google Shape;93;g13a8149c2c0_2_0:notes"/>
           <p:cNvSpPr txBox="1"/>
           <p:nvPr>
             <p:ph idx="1" type="body"/>
@@ -1927,7 +1927,7 @@
   <p:cSld>
     <p:spTree>
       <p:nvGrpSpPr>
-        <p:cNvPr id="250" name="Shape 250"/>
+        <p:cNvPr id="251" name="Shape 251"/>
         <p:cNvGrpSpPr/>
         <p:nvPr/>
       </p:nvGrpSpPr>
@@ -1941,7 +1941,7 @@
       </p:grpSpPr>
       <p:sp>
         <p:nvSpPr>
-          <p:cNvPr id="251" name="Google Shape;251;g13a8149c2c0_0_15:notes"/>
+          <p:cNvPr id="252" name="Google Shape;252;g13a8149c2c0_0_15:notes"/>
           <p:cNvSpPr/>
           <p:nvPr>
             <p:ph idx="2" type="sldImg"/>
@@ -1976,7 +1976,7 @@
       </p:sp>
       <p:sp>
         <p:nvSpPr>
-          <p:cNvPr id="252" name="Google Shape;252;g13a8149c2c0_0_15:notes"/>
+          <p:cNvPr id="253" name="Google Shape;253;g13a8149c2c0_0_15:notes"/>
           <p:cNvSpPr txBox="1"/>
           <p:nvPr>
             <p:ph idx="1" type="body"/>
@@ -2026,7 +2026,7 @@
   <p:cSld>
     <p:spTree>
       <p:nvGrpSpPr>
-        <p:cNvPr id="258" name="Shape 258"/>
+        <p:cNvPr id="259" name="Shape 259"/>
         <p:cNvGrpSpPr/>
         <p:nvPr/>
       </p:nvGrpSpPr>
@@ -2040,7 +2040,7 @@
       </p:grpSpPr>
       <p:sp>
         <p:nvSpPr>
-          <p:cNvPr id="259" name="Google Shape;259;g13a8149c2c0_0_20:notes"/>
+          <p:cNvPr id="260" name="Google Shape;260;g13a8149c2c0_0_20:notes"/>
           <p:cNvSpPr/>
           <p:nvPr>
             <p:ph idx="2" type="sldImg"/>
@@ -2075,7 +2075,7 @@
       </p:sp>
       <p:sp>
         <p:nvSpPr>
-          <p:cNvPr id="260" name="Google Shape;260;g13a8149c2c0_0_20:notes"/>
+          <p:cNvPr id="261" name="Google Shape;261;g13a8149c2c0_0_20:notes"/>
           <p:cNvSpPr txBox="1"/>
           <p:nvPr>
             <p:ph idx="1" type="body"/>
@@ -2125,7 +2125,7 @@
   <p:cSld>
     <p:spTree>
       <p:nvGrpSpPr>
-        <p:cNvPr id="267" name="Shape 267"/>
+        <p:cNvPr id="268" name="Shape 268"/>
         <p:cNvGrpSpPr/>
         <p:nvPr/>
       </p:nvGrpSpPr>
@@ -2139,7 +2139,7 @@
       </p:grpSpPr>
       <p:sp>
         <p:nvSpPr>
-          <p:cNvPr id="268" name="Google Shape;268;g135b9a59cea_0_9:notes"/>
+          <p:cNvPr id="269" name="Google Shape;269;g135b9a59cea_0_9:notes"/>
           <p:cNvSpPr/>
           <p:nvPr>
             <p:ph idx="2" type="sldImg"/>
@@ -2174,7 +2174,7 @@
       </p:sp>
       <p:sp>
         <p:nvSpPr>
-          <p:cNvPr id="269" name="Google Shape;269;g135b9a59cea_0_9:notes"/>
+          <p:cNvPr id="270" name="Google Shape;270;g135b9a59cea_0_9:notes"/>
           <p:cNvSpPr txBox="1"/>
           <p:nvPr>
             <p:ph idx="1" type="body"/>
@@ -2224,7 +2224,7 @@
   <p:cSld>
     <p:spTree>
       <p:nvGrpSpPr>
-        <p:cNvPr id="276" name="Shape 276"/>
+        <p:cNvPr id="277" name="Shape 277"/>
         <p:cNvGrpSpPr/>
         <p:nvPr/>
       </p:nvGrpSpPr>
@@ -2238,7 +2238,7 @@
       </p:grpSpPr>
       <p:sp>
         <p:nvSpPr>
-          <p:cNvPr id="277" name="Google Shape;277;g13650905f48_0_63:notes"/>
+          <p:cNvPr id="278" name="Google Shape;278;g13650905f48_0_63:notes"/>
           <p:cNvSpPr/>
           <p:nvPr>
             <p:ph idx="2" type="sldImg"/>
@@ -2273,7 +2273,7 @@
       </p:sp>
       <p:sp>
         <p:nvSpPr>
-          <p:cNvPr id="278" name="Google Shape;278;g13650905f48_0_63:notes"/>
+          <p:cNvPr id="279" name="Google Shape;279;g13650905f48_0_63:notes"/>
           <p:cNvSpPr txBox="1"/>
           <p:nvPr>
             <p:ph idx="1" type="body"/>
@@ -2323,7 +2323,7 @@
   <p:cSld>
     <p:spTree>
       <p:nvGrpSpPr>
-        <p:cNvPr id="282" name="Shape 282"/>
+        <p:cNvPr id="283" name="Shape 283"/>
         <p:cNvGrpSpPr/>
         <p:nvPr/>
       </p:nvGrpSpPr>
@@ -2337,7 +2337,7 @@
       </p:grpSpPr>
       <p:sp>
         <p:nvSpPr>
-          <p:cNvPr id="283" name="Google Shape;283;g13650905f48_0_46:notes"/>
+          <p:cNvPr id="284" name="Google Shape;284;g13650905f48_0_46:notes"/>
           <p:cNvSpPr/>
           <p:nvPr>
             <p:ph idx="2" type="sldImg"/>
@@ -2372,7 +2372,7 @@
       </p:sp>
       <p:sp>
         <p:nvSpPr>
-          <p:cNvPr id="284" name="Google Shape;284;g13650905f48_0_46:notes"/>
+          <p:cNvPr id="285" name="Google Shape;285;g13650905f48_0_46:notes"/>
           <p:cNvSpPr txBox="1"/>
           <p:nvPr>
             <p:ph idx="1" type="body"/>
@@ -2422,7 +2422,7 @@
   <p:cSld>
     <p:spTree>
       <p:nvGrpSpPr>
-        <p:cNvPr id="288" name="Shape 288"/>
+        <p:cNvPr id="289" name="Shape 289"/>
         <p:cNvGrpSpPr/>
         <p:nvPr/>
       </p:nvGrpSpPr>
@@ -2436,7 +2436,7 @@
       </p:grpSpPr>
       <p:sp>
         <p:nvSpPr>
-          <p:cNvPr id="289" name="Google Shape;289;g135b9a59cea_0_14:notes"/>
+          <p:cNvPr id="290" name="Google Shape;290;g13a8149c2c0_2_68:notes"/>
           <p:cNvSpPr/>
           <p:nvPr>
             <p:ph idx="2" type="sldImg"/>
@@ -2471,7 +2471,7 @@
       </p:sp>
       <p:sp>
         <p:nvSpPr>
-          <p:cNvPr id="290" name="Google Shape;290;g135b9a59cea_0_14:notes"/>
+          <p:cNvPr id="291" name="Google Shape;291;g13a8149c2c0_2_68:notes"/>
           <p:cNvSpPr txBox="1"/>
           <p:nvPr>
             <p:ph idx="1" type="body"/>
@@ -2521,7 +2521,7 @@
   <p:cSld>
     <p:spTree>
       <p:nvGrpSpPr>
-        <p:cNvPr id="295" name="Shape 295"/>
+        <p:cNvPr id="296" name="Shape 296"/>
         <p:cNvGrpSpPr/>
         <p:nvPr/>
       </p:nvGrpSpPr>
@@ -2535,7 +2535,7 @@
       </p:grpSpPr>
       <p:sp>
         <p:nvSpPr>
-          <p:cNvPr id="296" name="Google Shape;296;g13650905f48_0_57:notes"/>
+          <p:cNvPr id="297" name="Google Shape;297;g135b9a59cea_0_14:notes"/>
           <p:cNvSpPr/>
           <p:nvPr>
             <p:ph idx="2" type="sldImg"/>
@@ -2570,7 +2570,7 @@
       </p:sp>
       <p:sp>
         <p:nvSpPr>
-          <p:cNvPr id="297" name="Google Shape;297;g13650905f48_0_57:notes"/>
+          <p:cNvPr id="298" name="Google Shape;298;g135b9a59cea_0_14:notes"/>
           <p:cNvSpPr txBox="1"/>
           <p:nvPr>
             <p:ph idx="1" type="body"/>
@@ -2620,7 +2620,7 @@
   <p:cSld>
     <p:spTree>
       <p:nvGrpSpPr>
-        <p:cNvPr id="97" name="Shape 97"/>
+        <p:cNvPr id="98" name="Shape 98"/>
         <p:cNvGrpSpPr/>
         <p:nvPr/>
       </p:nvGrpSpPr>
@@ -2634,7 +2634,7 @@
       </p:grpSpPr>
       <p:sp>
         <p:nvSpPr>
-          <p:cNvPr id="98" name="Google Shape;98;g13650905f48_0_41:notes"/>
+          <p:cNvPr id="99" name="Google Shape;99;g13650905f48_0_41:notes"/>
           <p:cNvSpPr/>
           <p:nvPr>
             <p:ph idx="2" type="sldImg"/>
@@ -2669,7 +2669,7 @@
       </p:sp>
       <p:sp>
         <p:nvSpPr>
-          <p:cNvPr id="99" name="Google Shape;99;g13650905f48_0_41:notes"/>
+          <p:cNvPr id="100" name="Google Shape;100;g13650905f48_0_41:notes"/>
           <p:cNvSpPr txBox="1"/>
           <p:nvPr>
             <p:ph idx="1" type="body"/>
@@ -2719,7 +2719,7 @@
   <p:cSld>
     <p:spTree>
       <p:nvGrpSpPr>
-        <p:cNvPr id="104" name="Shape 104"/>
+        <p:cNvPr id="105" name="Shape 105"/>
         <p:cNvGrpSpPr/>
         <p:nvPr/>
       </p:nvGrpSpPr>
@@ -2733,7 +2733,7 @@
       </p:grpSpPr>
       <p:sp>
         <p:nvSpPr>
-          <p:cNvPr id="105" name="Google Shape;105;g13a8149c2c0_0_5:notes"/>
+          <p:cNvPr id="106" name="Google Shape;106;g13a8149c2c0_0_5:notes"/>
           <p:cNvSpPr/>
           <p:nvPr>
             <p:ph idx="2" type="sldImg"/>
@@ -2768,7 +2768,7 @@
       </p:sp>
       <p:sp>
         <p:nvSpPr>
-          <p:cNvPr id="106" name="Google Shape;106;g13a8149c2c0_0_5:notes"/>
+          <p:cNvPr id="107" name="Google Shape;107;g13a8149c2c0_0_5:notes"/>
           <p:cNvSpPr txBox="1"/>
           <p:nvPr>
             <p:ph idx="1" type="body"/>
@@ -2818,7 +2818,7 @@
   <p:cSld>
     <p:spTree>
       <p:nvGrpSpPr>
-        <p:cNvPr id="110" name="Shape 110"/>
+        <p:cNvPr id="111" name="Shape 111"/>
         <p:cNvGrpSpPr/>
         <p:nvPr/>
       </p:nvGrpSpPr>
@@ -2832,7 +2832,7 @@
       </p:grpSpPr>
       <p:sp>
         <p:nvSpPr>
-          <p:cNvPr id="111" name="Google Shape;111;g135b9a59cea_0_30:notes"/>
+          <p:cNvPr id="112" name="Google Shape;112;g135b9a59cea_0_30:notes"/>
           <p:cNvSpPr/>
           <p:nvPr>
             <p:ph idx="2" type="sldImg"/>
@@ -2867,7 +2867,7 @@
       </p:sp>
       <p:sp>
         <p:nvSpPr>
-          <p:cNvPr id="112" name="Google Shape;112;g135b9a59cea_0_30:notes"/>
+          <p:cNvPr id="113" name="Google Shape;113;g135b9a59cea_0_30:notes"/>
           <p:cNvSpPr txBox="1"/>
           <p:nvPr>
             <p:ph idx="1" type="body"/>
@@ -2917,7 +2917,7 @@
   <p:cSld>
     <p:spTree>
       <p:nvGrpSpPr>
-        <p:cNvPr id="137" name="Shape 137"/>
+        <p:cNvPr id="138" name="Shape 138"/>
         <p:cNvGrpSpPr/>
         <p:nvPr/>
       </p:nvGrpSpPr>
@@ -2931,7 +2931,7 @@
       </p:grpSpPr>
       <p:sp>
         <p:nvSpPr>
-          <p:cNvPr id="138" name="Google Shape;138;g135c4eca46f_0_0:notes"/>
+          <p:cNvPr id="139" name="Google Shape;139;g135c4eca46f_0_0:notes"/>
           <p:cNvSpPr/>
           <p:nvPr>
             <p:ph idx="2" type="sldImg"/>
@@ -2966,7 +2966,7 @@
       </p:sp>
       <p:sp>
         <p:nvSpPr>
-          <p:cNvPr id="139" name="Google Shape;139;g135c4eca46f_0_0:notes"/>
+          <p:cNvPr id="140" name="Google Shape;140;g135c4eca46f_0_0:notes"/>
           <p:cNvSpPr txBox="1"/>
           <p:nvPr>
             <p:ph idx="1" type="body"/>
@@ -3016,7 +3016,7 @@
   <p:cSld>
     <p:spTree>
       <p:nvGrpSpPr>
-        <p:cNvPr id="145" name="Shape 145"/>
+        <p:cNvPr id="146" name="Shape 146"/>
         <p:cNvGrpSpPr/>
         <p:nvPr/>
       </p:nvGrpSpPr>
@@ -3030,7 +3030,7 @@
       </p:grpSpPr>
       <p:sp>
         <p:nvSpPr>
-          <p:cNvPr id="146" name="Google Shape;146;g13a8149c2c0_3_0:notes"/>
+          <p:cNvPr id="147" name="Google Shape;147;g13a8149c2c0_3_0:notes"/>
           <p:cNvSpPr/>
           <p:nvPr>
             <p:ph idx="2" type="sldImg"/>
@@ -3065,7 +3065,7 @@
       </p:sp>
       <p:sp>
         <p:nvSpPr>
-          <p:cNvPr id="147" name="Google Shape;147;g13a8149c2c0_3_0:notes"/>
+          <p:cNvPr id="148" name="Google Shape;148;g13a8149c2c0_3_0:notes"/>
           <p:cNvSpPr txBox="1"/>
           <p:nvPr>
             <p:ph idx="1" type="body"/>
@@ -3115,7 +3115,7 @@
   <p:cSld>
     <p:spTree>
       <p:nvGrpSpPr>
-        <p:cNvPr id="152" name="Shape 152"/>
+        <p:cNvPr id="153" name="Shape 153"/>
         <p:cNvGrpSpPr/>
         <p:nvPr/>
       </p:nvGrpSpPr>
@@ -3129,7 +3129,7 @@
       </p:grpSpPr>
       <p:sp>
         <p:nvSpPr>
-          <p:cNvPr id="153" name="Google Shape;153;g13a8149c2c0_3_132:notes"/>
+          <p:cNvPr id="154" name="Google Shape;154;g13a8149c2c0_3_132:notes"/>
           <p:cNvSpPr/>
           <p:nvPr>
             <p:ph idx="2" type="sldImg"/>
@@ -3164,7 +3164,7 @@
       </p:sp>
       <p:sp>
         <p:nvSpPr>
-          <p:cNvPr id="154" name="Google Shape;154;g13a8149c2c0_3_132:notes"/>
+          <p:cNvPr id="155" name="Google Shape;155;g13a8149c2c0_3_132:notes"/>
           <p:cNvSpPr txBox="1"/>
           <p:nvPr>
             <p:ph idx="1" type="body"/>
@@ -3214,7 +3214,7 @@
   <p:cSld>
     <p:spTree>
       <p:nvGrpSpPr>
-        <p:cNvPr id="160" name="Shape 160"/>
+        <p:cNvPr id="161" name="Shape 161"/>
         <p:cNvGrpSpPr/>
         <p:nvPr/>
       </p:nvGrpSpPr>
@@ -3228,7 +3228,7 @@
       </p:grpSpPr>
       <p:sp>
         <p:nvSpPr>
-          <p:cNvPr id="161" name="Google Shape;161;g13a8149c2c0_3_144:notes"/>
+          <p:cNvPr id="162" name="Google Shape;162;g13a8149c2c0_3_144:notes"/>
           <p:cNvSpPr/>
           <p:nvPr>
             <p:ph idx="2" type="sldImg"/>
@@ -3263,7 +3263,7 @@
       </p:sp>
       <p:sp>
         <p:nvSpPr>
-          <p:cNvPr id="162" name="Google Shape;162;g13a8149c2c0_3_144:notes"/>
+          <p:cNvPr id="163" name="Google Shape;163;g13a8149c2c0_3_144:notes"/>
           <p:cNvSpPr txBox="1"/>
           <p:nvPr>
             <p:ph idx="1" type="body"/>
@@ -9942,6 +9942,58 @@
           </a:ln>
         </p:spPr>
       </p:pic>
+      <p:sp>
+        <p:nvSpPr>
+          <p:cNvPr id="90" name="Google Shape;90;p13"/>
+          <p:cNvSpPr txBox="1"/>
+          <p:nvPr/>
+        </p:nvSpPr>
+        <p:spPr>
+          <a:xfrm>
+            <a:off x="729450" y="4800400"/>
+            <a:ext cx="3877800" cy="292500"/>
+          </a:xfrm>
+          <a:prstGeom prst="rect">
+            <a:avLst/>
+          </a:prstGeom>
+          <a:noFill/>
+          <a:ln>
+            <a:noFill/>
+          </a:ln>
+        </p:spPr>
+        <p:txBody>
+          <a:bodyPr anchorCtr="0" anchor="t" bIns="91425" lIns="91425" spcFirstLastPara="1" rIns="91425" wrap="square" tIns="91425">
+            <a:spAutoFit/>
+          </a:bodyPr>
+          <a:lstStyle/>
+          <a:p>
+            <a:pPr indent="0" lvl="0" marL="0" rtl="0" algn="l">
+              <a:spcBef>
+                <a:spcPts val="0"/>
+              </a:spcBef>
+              <a:spcAft>
+                <a:spcPts val="0"/>
+              </a:spcAft>
+              <a:buNone/>
+            </a:pPr>
+            <a:r>
+              <a:rPr lang="en" sz="700">
+                <a:latin typeface="Lato"/>
+                <a:ea typeface="Lato"/>
+                <a:cs typeface="Lato"/>
+                <a:sym typeface="Lato"/>
+              </a:rPr>
+              <a:t>Picture source: https://www.vecteezy.com/vector-art/3223354-smart-plant-pot-icon-on-white</a:t>
+            </a:r>
+            <a:endParaRPr sz="700">
+              <a:latin typeface="Lato"/>
+              <a:ea typeface="Lato"/>
+              <a:cs typeface="Lato"/>
+              <a:sym typeface="Lato"/>
+            </a:endParaRPr>
+          </a:p>
+        </p:txBody>
+      </p:sp>
     </p:spTree>
   </p:cSld>
   <p:clrMapOvr>
@@ -9962,7 +10014,7 @@
     </p:bg>
     <p:spTree>
       <p:nvGrpSpPr>
-        <p:cNvPr id="172" name="Shape 172"/>
+        <p:cNvPr id="173" name="Shape 173"/>
         <p:cNvGrpSpPr/>
         <p:nvPr/>
       </p:nvGrpSpPr>
@@ -9976,7 +10028,7 @@
       </p:grpSpPr>
       <p:sp>
         <p:nvSpPr>
-          <p:cNvPr id="173" name="Google Shape;173;p22"/>
+          <p:cNvPr id="174" name="Google Shape;174;p22"/>
           <p:cNvSpPr txBox="1"/>
           <p:nvPr>
             <p:ph type="title"/>
@@ -10093,7 +10145,7 @@
       </p:sp>
       <p:sp>
         <p:nvSpPr>
-          <p:cNvPr id="174" name="Google Shape;174;p22"/>
+          <p:cNvPr id="175" name="Google Shape;175;p22"/>
           <p:cNvSpPr txBox="1"/>
           <p:nvPr>
             <p:ph idx="1" type="body"/>
@@ -10159,7 +10211,7 @@
       </p:sp>
       <p:sp>
         <p:nvSpPr>
-          <p:cNvPr id="175" name="Google Shape;175;p22"/>
+          <p:cNvPr id="176" name="Google Shape;176;p22"/>
           <p:cNvSpPr txBox="1"/>
           <p:nvPr>
             <p:ph idx="12" type="sldNum"/>
@@ -10217,7 +10269,7 @@
     </p:bg>
     <p:spTree>
       <p:nvGrpSpPr>
-        <p:cNvPr id="179" name="Shape 179"/>
+        <p:cNvPr id="180" name="Shape 180"/>
         <p:cNvGrpSpPr/>
         <p:nvPr/>
       </p:nvGrpSpPr>
@@ -10231,7 +10283,7 @@
       </p:grpSpPr>
       <p:sp>
         <p:nvSpPr>
-          <p:cNvPr id="180" name="Google Shape;180;p23"/>
+          <p:cNvPr id="181" name="Google Shape;181;p23"/>
           <p:cNvSpPr txBox="1"/>
           <p:nvPr>
             <p:ph type="title"/>
@@ -10352,7 +10404,7 @@
       </p:sp>
       <p:pic>
         <p:nvPicPr>
-          <p:cNvPr id="181" name="Google Shape;181;p23"/>
+          <p:cNvPr id="182" name="Google Shape;182;p23"/>
           <p:cNvPicPr preferRelativeResize="0"/>
           <p:nvPr/>
         </p:nvPicPr>
@@ -10380,7 +10432,7 @@
       </p:pic>
       <p:sp>
         <p:nvSpPr>
-          <p:cNvPr id="182" name="Google Shape;182;p23"/>
+          <p:cNvPr id="183" name="Google Shape;183;p23"/>
           <p:cNvSpPr txBox="1"/>
           <p:nvPr/>
         </p:nvSpPr>
@@ -10432,7 +10484,7 @@
       </p:sp>
       <p:sp>
         <p:nvSpPr>
-          <p:cNvPr id="183" name="Google Shape;183;p23"/>
+          <p:cNvPr id="184" name="Google Shape;184;p23"/>
           <p:cNvSpPr txBox="1"/>
           <p:nvPr>
             <p:ph idx="12" type="sldNum"/>
@@ -10490,7 +10542,7 @@
     </p:bg>
     <p:spTree>
       <p:nvGrpSpPr>
-        <p:cNvPr id="187" name="Shape 187"/>
+        <p:cNvPr id="188" name="Shape 188"/>
         <p:cNvGrpSpPr/>
         <p:nvPr/>
       </p:nvGrpSpPr>
@@ -10504,7 +10556,7 @@
       </p:grpSpPr>
       <p:pic>
         <p:nvPicPr>
-          <p:cNvPr id="188" name="Google Shape;188;p24"/>
+          <p:cNvPr id="189" name="Google Shape;189;p24"/>
           <p:cNvPicPr preferRelativeResize="0"/>
           <p:nvPr/>
         </p:nvPicPr>
@@ -10532,7 +10584,7 @@
       </p:pic>
       <p:sp>
         <p:nvSpPr>
-          <p:cNvPr id="189" name="Google Shape;189;p24"/>
+          <p:cNvPr id="190" name="Google Shape;190;p24"/>
           <p:cNvSpPr txBox="1"/>
           <p:nvPr>
             <p:ph type="title"/>
@@ -10572,7 +10624,7 @@
       </p:sp>
       <p:sp>
         <p:nvSpPr>
-          <p:cNvPr id="190" name="Google Shape;190;p24"/>
+          <p:cNvPr id="191" name="Google Shape;191;p24"/>
           <p:cNvSpPr txBox="1"/>
           <p:nvPr/>
         </p:nvSpPr>
@@ -10618,7 +10670,7 @@
       </p:sp>
       <p:sp>
         <p:nvSpPr>
-          <p:cNvPr id="191" name="Google Shape;191;p24"/>
+          <p:cNvPr id="192" name="Google Shape;192;p24"/>
           <p:cNvSpPr txBox="1"/>
           <p:nvPr/>
         </p:nvSpPr>
@@ -11004,7 +11056,7 @@
       </p:sp>
       <p:sp>
         <p:nvSpPr>
-          <p:cNvPr id="192" name="Google Shape;192;p24"/>
+          <p:cNvPr id="193" name="Google Shape;193;p24"/>
           <p:cNvSpPr txBox="1"/>
           <p:nvPr/>
         </p:nvSpPr>
@@ -11056,7 +11108,7 @@
       </p:sp>
       <p:pic>
         <p:nvPicPr>
-          <p:cNvPr id="193" name="Google Shape;193;p24"/>
+          <p:cNvPr id="194" name="Google Shape;194;p24"/>
           <p:cNvPicPr preferRelativeResize="0"/>
           <p:nvPr/>
         </p:nvPicPr>
@@ -11083,7 +11135,7 @@
       </p:pic>
       <p:pic>
         <p:nvPicPr>
-          <p:cNvPr id="194" name="Google Shape;194;p24"/>
+          <p:cNvPr id="195" name="Google Shape;195;p24"/>
           <p:cNvPicPr preferRelativeResize="0"/>
           <p:nvPr/>
         </p:nvPicPr>
@@ -11111,7 +11163,7 @@
       </p:pic>
       <p:pic>
         <p:nvPicPr>
-          <p:cNvPr id="195" name="Google Shape;195;p24"/>
+          <p:cNvPr id="196" name="Google Shape;196;p24"/>
           <p:cNvPicPr preferRelativeResize="0"/>
           <p:nvPr/>
         </p:nvPicPr>
@@ -11139,7 +11191,7 @@
       </p:pic>
       <p:pic>
         <p:nvPicPr>
-          <p:cNvPr id="196" name="Google Shape;196;p24"/>
+          <p:cNvPr id="197" name="Google Shape;197;p24"/>
           <p:cNvPicPr preferRelativeResize="0"/>
           <p:nvPr/>
         </p:nvPicPr>
@@ -11167,7 +11219,7 @@
       </p:pic>
       <p:sp>
         <p:nvSpPr>
-          <p:cNvPr id="197" name="Google Shape;197;p24"/>
+          <p:cNvPr id="198" name="Google Shape;198;p24"/>
           <p:cNvSpPr txBox="1"/>
           <p:nvPr>
             <p:ph idx="12" type="sldNum"/>
@@ -11225,7 +11277,7 @@
     </p:bg>
     <p:spTree>
       <p:nvGrpSpPr>
-        <p:cNvPr id="201" name="Shape 201"/>
+        <p:cNvPr id="202" name="Shape 202"/>
         <p:cNvGrpSpPr/>
         <p:nvPr/>
       </p:nvGrpSpPr>
@@ -11239,7 +11291,7 @@
       </p:grpSpPr>
       <p:sp>
         <p:nvSpPr>
-          <p:cNvPr id="202" name="Google Shape;202;p25"/>
+          <p:cNvPr id="203" name="Google Shape;203;p25"/>
           <p:cNvSpPr txBox="1"/>
           <p:nvPr>
             <p:ph type="ctrTitle"/>
@@ -11283,7 +11335,7 @@
       </p:sp>
       <p:sp>
         <p:nvSpPr>
-          <p:cNvPr id="203" name="Google Shape;203;p25"/>
+          <p:cNvPr id="204" name="Google Shape;204;p25"/>
           <p:cNvSpPr txBox="1"/>
           <p:nvPr>
             <p:ph idx="1" type="subTitle"/>
@@ -11322,7 +11374,7 @@
       </p:sp>
       <p:sp>
         <p:nvSpPr>
-          <p:cNvPr id="204" name="Google Shape;204;p25"/>
+          <p:cNvPr id="205" name="Google Shape;205;p25"/>
           <p:cNvSpPr txBox="1"/>
           <p:nvPr>
             <p:ph idx="12" type="sldNum"/>
@@ -11380,7 +11432,7 @@
     </p:bg>
     <p:spTree>
       <p:nvGrpSpPr>
-        <p:cNvPr id="208" name="Shape 208"/>
+        <p:cNvPr id="209" name="Shape 209"/>
         <p:cNvGrpSpPr/>
         <p:nvPr/>
       </p:nvGrpSpPr>
@@ -11394,7 +11446,7 @@
       </p:grpSpPr>
       <p:sp>
         <p:nvSpPr>
-          <p:cNvPr id="209" name="Google Shape;209;p26"/>
+          <p:cNvPr id="210" name="Google Shape;210;p26"/>
           <p:cNvSpPr txBox="1"/>
           <p:nvPr>
             <p:ph type="ctrTitle"/>
@@ -11434,7 +11486,7 @@
       </p:sp>
       <p:pic>
         <p:nvPicPr>
-          <p:cNvPr id="210" name="Google Shape;210;p26"/>
+          <p:cNvPr id="211" name="Google Shape;211;p26"/>
           <p:cNvPicPr preferRelativeResize="0"/>
           <p:nvPr/>
         </p:nvPicPr>
@@ -11462,7 +11514,7 @@
       </p:pic>
       <p:sp>
         <p:nvSpPr>
-          <p:cNvPr id="211" name="Google Shape;211;p26"/>
+          <p:cNvPr id="212" name="Google Shape;212;p26"/>
           <p:cNvSpPr txBox="1"/>
           <p:nvPr>
             <p:ph idx="12" type="sldNum"/>
@@ -11520,7 +11572,7 @@
     </p:bg>
     <p:spTree>
       <p:nvGrpSpPr>
-        <p:cNvPr id="215" name="Shape 215"/>
+        <p:cNvPr id="216" name="Shape 216"/>
         <p:cNvGrpSpPr/>
         <p:nvPr/>
       </p:nvGrpSpPr>
@@ -11534,7 +11586,7 @@
       </p:grpSpPr>
       <p:sp>
         <p:nvSpPr>
-          <p:cNvPr id="216" name="Google Shape;216;p27"/>
+          <p:cNvPr id="217" name="Google Shape;217;p27"/>
           <p:cNvSpPr txBox="1"/>
           <p:nvPr>
             <p:ph type="ctrTitle"/>
@@ -11574,7 +11626,7 @@
       </p:sp>
       <p:pic>
         <p:nvPicPr>
-          <p:cNvPr id="217" name="Google Shape;217;p27"/>
+          <p:cNvPr id="218" name="Google Shape;218;p27"/>
           <p:cNvPicPr preferRelativeResize="0"/>
           <p:nvPr/>
         </p:nvPicPr>
@@ -11602,7 +11654,7 @@
       </p:pic>
       <p:sp>
         <p:nvSpPr>
-          <p:cNvPr id="218" name="Google Shape;218;p27"/>
+          <p:cNvPr id="219" name="Google Shape;219;p27"/>
           <p:cNvSpPr txBox="1"/>
           <p:nvPr>
             <p:ph idx="12" type="sldNum"/>
@@ -11660,7 +11712,7 @@
     </p:bg>
     <p:spTree>
       <p:nvGrpSpPr>
-        <p:cNvPr id="222" name="Shape 222"/>
+        <p:cNvPr id="223" name="Shape 223"/>
         <p:cNvGrpSpPr/>
         <p:nvPr/>
       </p:nvGrpSpPr>
@@ -11674,7 +11726,7 @@
       </p:grpSpPr>
       <p:sp>
         <p:nvSpPr>
-          <p:cNvPr id="223" name="Google Shape;223;p28"/>
+          <p:cNvPr id="224" name="Google Shape;224;p28"/>
           <p:cNvSpPr txBox="1"/>
           <p:nvPr>
             <p:ph type="ctrTitle"/>
@@ -11714,7 +11766,7 @@
       </p:sp>
       <p:pic>
         <p:nvPicPr>
-          <p:cNvPr id="224" name="Google Shape;224;p28"/>
+          <p:cNvPr id="225" name="Google Shape;225;p28"/>
           <p:cNvPicPr preferRelativeResize="0"/>
           <p:nvPr/>
         </p:nvPicPr>
@@ -11741,7 +11793,7 @@
       </p:pic>
       <p:sp>
         <p:nvSpPr>
-          <p:cNvPr id="225" name="Google Shape;225;p28"/>
+          <p:cNvPr id="226" name="Google Shape;226;p28"/>
           <p:cNvSpPr txBox="1"/>
           <p:nvPr>
             <p:ph idx="12" type="sldNum"/>
@@ -11799,7 +11851,7 @@
     </p:bg>
     <p:spTree>
       <p:nvGrpSpPr>
-        <p:cNvPr id="229" name="Shape 229"/>
+        <p:cNvPr id="230" name="Shape 230"/>
         <p:cNvGrpSpPr/>
         <p:nvPr/>
       </p:nvGrpSpPr>
@@ -11813,7 +11865,7 @@
       </p:grpSpPr>
       <p:sp>
         <p:nvSpPr>
-          <p:cNvPr id="230" name="Google Shape;230;p29"/>
+          <p:cNvPr id="231" name="Google Shape;231;p29"/>
           <p:cNvSpPr txBox="1"/>
           <p:nvPr>
             <p:ph type="ctrTitle"/>
@@ -11822,7 +11874,7 @@
         <p:spPr>
           <a:xfrm>
             <a:off x="729450" y="1322450"/>
-            <a:ext cx="7688100" cy="1664700"/>
+            <a:ext cx="7911300" cy="1664700"/>
           </a:xfrm>
           <a:prstGeom prst="rect">
             <a:avLst/>
@@ -11845,7 +11897,7 @@
             </a:pPr>
             <a:r>
               <a:rPr lang="en"/>
-              <a:t>Implementation description</a:t>
+              <a:t>5. Implementation description</a:t>
             </a:r>
             <a:endParaRPr/>
           </a:p>
@@ -11853,7 +11905,7 @@
       </p:sp>
       <p:sp>
         <p:nvSpPr>
-          <p:cNvPr id="231" name="Google Shape;231;p29"/>
+          <p:cNvPr id="232" name="Google Shape;232;p29"/>
           <p:cNvSpPr txBox="1"/>
           <p:nvPr>
             <p:ph idx="1" type="subTitle"/>
@@ -11892,7 +11944,7 @@
       </p:sp>
       <p:sp>
         <p:nvSpPr>
-          <p:cNvPr id="232" name="Google Shape;232;p29"/>
+          <p:cNvPr id="233" name="Google Shape;233;p29"/>
           <p:cNvSpPr txBox="1"/>
           <p:nvPr>
             <p:ph idx="12" type="sldNum"/>
@@ -11950,7 +12002,7 @@
     </p:bg>
     <p:spTree>
       <p:nvGrpSpPr>
-        <p:cNvPr id="236" name="Shape 236"/>
+        <p:cNvPr id="237" name="Shape 237"/>
         <p:cNvGrpSpPr/>
         <p:nvPr/>
       </p:nvGrpSpPr>
@@ -11964,7 +12016,7 @@
       </p:grpSpPr>
       <p:sp>
         <p:nvSpPr>
-          <p:cNvPr id="237" name="Google Shape;237;p30"/>
+          <p:cNvPr id="238" name="Google Shape;238;p30"/>
           <p:cNvSpPr txBox="1"/>
           <p:nvPr>
             <p:ph type="title"/>
@@ -12004,7 +12056,7 @@
       </p:sp>
       <p:pic>
         <p:nvPicPr>
-          <p:cNvPr id="238" name="Google Shape;238;p30"/>
+          <p:cNvPr id="239" name="Google Shape;239;p30"/>
           <p:cNvPicPr preferRelativeResize="0"/>
           <p:nvPr/>
         </p:nvPicPr>
@@ -12032,7 +12084,7 @@
       </p:pic>
       <p:sp>
         <p:nvSpPr>
-          <p:cNvPr id="239" name="Google Shape;239;p30"/>
+          <p:cNvPr id="240" name="Google Shape;240;p30"/>
           <p:cNvSpPr txBox="1"/>
           <p:nvPr>
             <p:ph idx="12" type="sldNum"/>
@@ -12090,7 +12142,7 @@
     </p:bg>
     <p:spTree>
       <p:nvGrpSpPr>
-        <p:cNvPr id="243" name="Shape 243"/>
+        <p:cNvPr id="244" name="Shape 244"/>
         <p:cNvGrpSpPr/>
         <p:nvPr/>
       </p:nvGrpSpPr>
@@ -12104,7 +12156,7 @@
       </p:grpSpPr>
       <p:sp>
         <p:nvSpPr>
-          <p:cNvPr id="244" name="Google Shape;244;p31"/>
+          <p:cNvPr id="245" name="Google Shape;245;p31"/>
           <p:cNvSpPr txBox="1"/>
           <p:nvPr>
             <p:ph type="title"/>
@@ -12144,7 +12196,7 @@
       </p:sp>
       <p:sp>
         <p:nvSpPr>
-          <p:cNvPr id="245" name="Google Shape;245;p31"/>
+          <p:cNvPr id="246" name="Google Shape;246;p31"/>
           <p:cNvSpPr txBox="1"/>
           <p:nvPr>
             <p:ph idx="1" type="body"/>
@@ -12183,7 +12235,7 @@
       </p:sp>
       <p:pic>
         <p:nvPicPr>
-          <p:cNvPr id="246" name="Google Shape;246;p31"/>
+          <p:cNvPr id="247" name="Google Shape;247;p31"/>
           <p:cNvPicPr preferRelativeResize="0"/>
           <p:nvPr/>
         </p:nvPicPr>
@@ -12211,7 +12263,7 @@
       </p:pic>
       <p:pic>
         <p:nvPicPr>
-          <p:cNvPr id="247" name="Google Shape;247;p31"/>
+          <p:cNvPr id="248" name="Google Shape;248;p31"/>
           <p:cNvPicPr preferRelativeResize="0"/>
           <p:nvPr/>
         </p:nvPicPr>
@@ -12239,7 +12291,7 @@
       </p:pic>
       <p:pic>
         <p:nvPicPr>
-          <p:cNvPr id="248" name="Google Shape;248;p31"/>
+          <p:cNvPr id="249" name="Google Shape;249;p31"/>
           <p:cNvPicPr preferRelativeResize="0"/>
           <p:nvPr/>
         </p:nvPicPr>
@@ -12267,7 +12319,7 @@
       </p:pic>
       <p:sp>
         <p:nvSpPr>
-          <p:cNvPr id="249" name="Google Shape;249;p31"/>
+          <p:cNvPr id="250" name="Google Shape;250;p31"/>
           <p:cNvSpPr txBox="1"/>
           <p:nvPr>
             <p:ph idx="12" type="sldNum"/>
@@ -12325,7 +12377,7 @@
     </p:bg>
     <p:spTree>
       <p:nvGrpSpPr>
-        <p:cNvPr id="93" name="Shape 93"/>
+        <p:cNvPr id="94" name="Shape 94"/>
         <p:cNvGrpSpPr/>
         <p:nvPr/>
       </p:nvGrpSpPr>
@@ -12339,7 +12391,7 @@
       </p:grpSpPr>
       <p:sp>
         <p:nvSpPr>
-          <p:cNvPr id="94" name="Google Shape;94;p14"/>
+          <p:cNvPr id="95" name="Google Shape;95;p14"/>
           <p:cNvSpPr txBox="1"/>
           <p:nvPr>
             <p:ph type="ctrTitle"/>
@@ -12394,14 +12446,14 @@
       </p:sp>
       <p:sp>
         <p:nvSpPr>
-          <p:cNvPr id="95" name="Google Shape;95;p14"/>
+          <p:cNvPr id="96" name="Google Shape;96;p14"/>
           <p:cNvSpPr txBox="1"/>
           <p:nvPr/>
         </p:nvSpPr>
         <p:spPr>
           <a:xfrm>
             <a:off x="729450" y="2131225"/>
-            <a:ext cx="7884300" cy="2154900"/>
+            <a:ext cx="7884300" cy="1908600"/>
           </a:xfrm>
           <a:prstGeom prst="rect">
             <a:avLst/>
@@ -12576,34 +12628,6 @@
                 <a:sym typeface="Lato"/>
               </a:rPr>
               <a:t>Video demonstration. (Neero)</a:t>
-            </a:r>
-            <a:endParaRPr sz="1600">
-              <a:latin typeface="Lato"/>
-              <a:ea typeface="Lato"/>
-              <a:cs typeface="Lato"/>
-              <a:sym typeface="Lato"/>
-            </a:endParaRPr>
-          </a:p>
-          <a:p>
-            <a:pPr indent="-330200" lvl="0" marL="457200" rtl="0" algn="l">
-              <a:spcBef>
-                <a:spcPts val="0"/>
-              </a:spcBef>
-              <a:spcAft>
-                <a:spcPts val="0"/>
-              </a:spcAft>
-              <a:buSzPts val="1600"/>
-              <a:buFont typeface="Lato"/>
-              <a:buAutoNum type="arabicPeriod"/>
-            </a:pPr>
-            <a:r>
-              <a:rPr lang="en" sz="1600">
-                <a:latin typeface="Lato"/>
-                <a:ea typeface="Lato"/>
-                <a:cs typeface="Lato"/>
-                <a:sym typeface="Lato"/>
-              </a:rPr>
-              <a:t>Results. (Neero)</a:t>
             </a:r>
             <a:endParaRPr sz="1600">
               <a:latin typeface="Lato"/>
@@ -12653,7 +12677,7 @@
       </p:sp>
       <p:sp>
         <p:nvSpPr>
-          <p:cNvPr id="96" name="Google Shape;96;p14"/>
+          <p:cNvPr id="97" name="Google Shape;97;p14"/>
           <p:cNvSpPr txBox="1"/>
           <p:nvPr>
             <p:ph idx="12" type="sldNum"/>
@@ -12711,7 +12735,7 @@
     </p:bg>
     <p:spTree>
       <p:nvGrpSpPr>
-        <p:cNvPr id="253" name="Shape 253"/>
+        <p:cNvPr id="254" name="Shape 254"/>
         <p:cNvGrpSpPr/>
         <p:nvPr/>
       </p:nvGrpSpPr>
@@ -12725,7 +12749,7 @@
       </p:grpSpPr>
       <p:sp>
         <p:nvSpPr>
-          <p:cNvPr id="254" name="Google Shape;254;p32"/>
+          <p:cNvPr id="255" name="Google Shape;255;p32"/>
           <p:cNvSpPr txBox="1"/>
           <p:nvPr>
             <p:ph type="title"/>
@@ -12765,7 +12789,7 @@
       </p:sp>
       <p:sp>
         <p:nvSpPr>
-          <p:cNvPr id="255" name="Google Shape;255;p32"/>
+          <p:cNvPr id="256" name="Google Shape;256;p32"/>
           <p:cNvSpPr txBox="1"/>
           <p:nvPr>
             <p:ph idx="12" type="sldNum"/>
@@ -12805,7 +12829,7 @@
       </p:sp>
       <p:pic>
         <p:nvPicPr>
-          <p:cNvPr id="256" name="Google Shape;256;p32"/>
+          <p:cNvPr id="257" name="Google Shape;257;p32"/>
           <p:cNvPicPr preferRelativeResize="0"/>
           <p:nvPr/>
         </p:nvPicPr>
@@ -12833,7 +12857,7 @@
       </p:pic>
       <p:pic>
         <p:nvPicPr>
-          <p:cNvPr id="257" name="Google Shape;257;p32"/>
+          <p:cNvPr id="258" name="Google Shape;258;p32"/>
           <p:cNvPicPr preferRelativeResize="0"/>
           <p:nvPr/>
         </p:nvPicPr>
@@ -12879,7 +12903,7 @@
     </p:bg>
     <p:spTree>
       <p:nvGrpSpPr>
-        <p:cNvPr id="261" name="Shape 261"/>
+        <p:cNvPr id="262" name="Shape 262"/>
         <p:cNvGrpSpPr/>
         <p:nvPr/>
       </p:nvGrpSpPr>
@@ -12893,7 +12917,7 @@
       </p:grpSpPr>
       <p:sp>
         <p:nvSpPr>
-          <p:cNvPr id="262" name="Google Shape;262;p33"/>
+          <p:cNvPr id="263" name="Google Shape;263;p33"/>
           <p:cNvSpPr txBox="1"/>
           <p:nvPr>
             <p:ph type="title"/>
@@ -12933,7 +12957,7 @@
       </p:sp>
       <p:sp>
         <p:nvSpPr>
-          <p:cNvPr id="263" name="Google Shape;263;p33"/>
+          <p:cNvPr id="264" name="Google Shape;264;p33"/>
           <p:cNvSpPr txBox="1"/>
           <p:nvPr>
             <p:ph idx="12" type="sldNum"/>
@@ -12973,7 +12997,7 @@
       </p:sp>
       <p:pic>
         <p:nvPicPr>
-          <p:cNvPr id="264" name="Google Shape;264;p33"/>
+          <p:cNvPr id="265" name="Google Shape;265;p33"/>
           <p:cNvPicPr preferRelativeResize="0"/>
           <p:nvPr/>
         </p:nvPicPr>
@@ -13001,7 +13025,7 @@
       </p:pic>
       <p:pic>
         <p:nvPicPr>
-          <p:cNvPr id="265" name="Google Shape;265;p33"/>
+          <p:cNvPr id="266" name="Google Shape;266;p33"/>
           <p:cNvPicPr preferRelativeResize="0"/>
           <p:nvPr/>
         </p:nvPicPr>
@@ -13029,7 +13053,7 @@
       </p:pic>
       <p:pic>
         <p:nvPicPr>
-          <p:cNvPr id="266" name="Google Shape;266;p33"/>
+          <p:cNvPr id="267" name="Google Shape;267;p33"/>
           <p:cNvPicPr preferRelativeResize="0"/>
           <p:nvPr/>
         </p:nvPicPr>
@@ -13075,7 +13099,7 @@
     </p:bg>
     <p:spTree>
       <p:nvGrpSpPr>
-        <p:cNvPr id="270" name="Shape 270"/>
+        <p:cNvPr id="271" name="Shape 271"/>
         <p:cNvGrpSpPr/>
         <p:nvPr/>
       </p:nvGrpSpPr>
@@ -13089,7 +13113,7 @@
       </p:grpSpPr>
       <p:sp>
         <p:nvSpPr>
-          <p:cNvPr id="271" name="Google Shape;271;p34"/>
+          <p:cNvPr id="272" name="Google Shape;272;p34"/>
           <p:cNvSpPr txBox="1"/>
           <p:nvPr>
             <p:ph type="title"/>
@@ -13129,7 +13153,7 @@
       </p:sp>
       <p:sp>
         <p:nvSpPr>
-          <p:cNvPr id="272" name="Google Shape;272;p34"/>
+          <p:cNvPr id="273" name="Google Shape;273;p34"/>
           <p:cNvSpPr txBox="1"/>
           <p:nvPr>
             <p:ph idx="1" type="body"/>
@@ -13177,7 +13201,7 @@
       </p:sp>
       <p:sp>
         <p:nvSpPr>
-          <p:cNvPr id="273" name="Google Shape;273;p34"/>
+          <p:cNvPr id="274" name="Google Shape;274;p34"/>
           <p:cNvSpPr txBox="1"/>
           <p:nvPr>
             <p:ph idx="12" type="sldNum"/>
@@ -13217,7 +13241,7 @@
       </p:sp>
       <p:pic>
         <p:nvPicPr>
-          <p:cNvPr id="274" name="Google Shape;274;p34"/>
+          <p:cNvPr id="275" name="Google Shape;275;p34"/>
           <p:cNvPicPr preferRelativeResize="0"/>
           <p:nvPr/>
         </p:nvPicPr>
@@ -13245,7 +13269,7 @@
       </p:pic>
       <p:pic>
         <p:nvPicPr>
-          <p:cNvPr id="275" name="Google Shape;275;p34"/>
+          <p:cNvPr id="276" name="Google Shape;276;p34"/>
           <p:cNvPicPr preferRelativeResize="0"/>
           <p:nvPr/>
         </p:nvPicPr>
@@ -13291,7 +13315,7 @@
     </p:bg>
     <p:spTree>
       <p:nvGrpSpPr>
-        <p:cNvPr id="279" name="Shape 279"/>
+        <p:cNvPr id="280" name="Shape 280"/>
         <p:cNvGrpSpPr/>
         <p:nvPr/>
       </p:nvGrpSpPr>
@@ -13305,7 +13329,7 @@
       </p:grpSpPr>
       <p:sp>
         <p:nvSpPr>
-          <p:cNvPr id="280" name="Google Shape;280;p35"/>
+          <p:cNvPr id="281" name="Google Shape;281;p35"/>
           <p:cNvSpPr txBox="1"/>
           <p:nvPr>
             <p:ph idx="1" type="body"/>
@@ -13338,6 +13362,18 @@
               </a:spcAft>
               <a:buNone/>
             </a:pPr>
+            <a:r>
+              <a:rPr b="1" lang="en" sz="5100">
+                <a:solidFill>
+                  <a:schemeClr val="dk2"/>
+                </a:solidFill>
+                <a:latin typeface="Raleway"/>
+                <a:ea typeface="Raleway"/>
+                <a:cs typeface="Raleway"/>
+                <a:sym typeface="Raleway"/>
+              </a:rPr>
+              <a:t>6. </a:t>
+            </a:r>
             <a:r>
               <a:rPr b="1" lang="en" sz="5100">
                 <a:solidFill>
@@ -13356,7 +13392,7 @@
       </p:sp>
       <p:sp>
         <p:nvSpPr>
-          <p:cNvPr id="281" name="Google Shape;281;p35"/>
+          <p:cNvPr id="282" name="Google Shape;282;p35"/>
           <p:cNvSpPr txBox="1"/>
           <p:nvPr>
             <p:ph idx="12" type="sldNum"/>
@@ -13414,7 +13450,7 @@
     </p:bg>
     <p:spTree>
       <p:nvGrpSpPr>
-        <p:cNvPr id="285" name="Shape 285"/>
+        <p:cNvPr id="286" name="Shape 286"/>
         <p:cNvGrpSpPr/>
         <p:nvPr/>
       </p:nvGrpSpPr>
@@ -13428,7 +13464,7 @@
       </p:grpSpPr>
       <p:pic>
         <p:nvPicPr>
-          <p:cNvPr id="286" name="Google Shape;286;p36" title="MQTT smart plant pot project">
+          <p:cNvPr id="287" name="Google Shape;287;p36" title="MQTT smart plant pot project">
             <a:hlinkClick r:id="rId3"/>
           </p:cNvPr>
           <p:cNvPicPr preferRelativeResize="0"/>
@@ -13458,7 +13494,7 @@
       </p:pic>
       <p:sp>
         <p:nvSpPr>
-          <p:cNvPr id="287" name="Google Shape;287;p36"/>
+          <p:cNvPr id="288" name="Google Shape;288;p36"/>
           <p:cNvSpPr txBox="1"/>
           <p:nvPr>
             <p:ph idx="12" type="sldNum"/>
@@ -13535,7 +13571,7 @@
                                           </p:stCondLst>
                                         </p:cTn>
                                         <p:tgtEl>
-                                          <p:spTgt spid="286"/>
+                                          <p:spTgt spid="287"/>
                                         </p:tgtEl>
                                         <p:attrNameLst>
                                           <p:attrName>style.visibility</p:attrName>
@@ -13549,7 +13585,7 @@
                                       <p:cBhvr>
                                         <p:cTn dur="1000"/>
                                         <p:tgtEl>
-                                          <p:spTgt spid="286"/>
+                                          <p:spTgt spid="287"/>
                                         </p:tgtEl>
                                       </p:cBhvr>
                                     </p:animEffect>
@@ -13599,7 +13635,7 @@
     </p:bg>
     <p:spTree>
       <p:nvGrpSpPr>
-        <p:cNvPr id="291" name="Shape 291"/>
+        <p:cNvPr id="292" name="Shape 292"/>
         <p:cNvGrpSpPr/>
         <p:nvPr/>
       </p:nvGrpSpPr>
@@ -13613,7 +13649,345 @@
       </p:grpSpPr>
       <p:sp>
         <p:nvSpPr>
-          <p:cNvPr id="292" name="Google Shape;292;p37"/>
+          <p:cNvPr id="293" name="Google Shape;293;p37"/>
+          <p:cNvSpPr txBox="1"/>
+          <p:nvPr>
+            <p:ph type="ctrTitle"/>
+          </p:nvPr>
+        </p:nvSpPr>
+        <p:spPr>
+          <a:xfrm>
+            <a:off x="727950" y="1238550"/>
+            <a:ext cx="7688100" cy="1664700"/>
+          </a:xfrm>
+          <a:prstGeom prst="rect">
+            <a:avLst/>
+          </a:prstGeom>
+        </p:spPr>
+        <p:txBody>
+          <a:bodyPr anchorCtr="0" anchor="t" bIns="91425" lIns="91425" spcFirstLastPara="1" rIns="91425" wrap="square" tIns="91425">
+            <a:normAutofit/>
+          </a:bodyPr>
+          <a:lstStyle/>
+          <a:p>
+            <a:pPr indent="0" lvl="0" marL="0" rtl="0" algn="l">
+              <a:spcBef>
+                <a:spcPts val="0"/>
+              </a:spcBef>
+              <a:spcAft>
+                <a:spcPts val="0"/>
+              </a:spcAft>
+              <a:buNone/>
+            </a:pPr>
+            <a:r>
+              <a:rPr lang="en"/>
+              <a:t>7. Summary</a:t>
+            </a:r>
+            <a:endParaRPr/>
+          </a:p>
+        </p:txBody>
+      </p:sp>
+      <p:sp>
+        <p:nvSpPr>
+          <p:cNvPr id="294" name="Google Shape;294;p37"/>
+          <p:cNvSpPr txBox="1"/>
+          <p:nvPr>
+            <p:ph idx="1" type="subTitle"/>
+          </p:nvPr>
+        </p:nvSpPr>
+        <p:spPr>
+          <a:xfrm>
+            <a:off x="729450" y="2120950"/>
+            <a:ext cx="7688100" cy="2628900"/>
+          </a:xfrm>
+          <a:prstGeom prst="rect">
+            <a:avLst/>
+          </a:prstGeom>
+        </p:spPr>
+        <p:txBody>
+          <a:bodyPr anchorCtr="0" anchor="t" bIns="91425" lIns="91425" spcFirstLastPara="1" rIns="91425" wrap="square" tIns="91425">
+            <a:normAutofit/>
+          </a:bodyPr>
+          <a:lstStyle/>
+          <a:p>
+            <a:pPr indent="-317500" lvl="0" marL="457200" rtl="0" algn="l">
+              <a:lnSpc>
+                <a:spcPct val="150000"/>
+              </a:lnSpc>
+              <a:spcBef>
+                <a:spcPts val="0"/>
+              </a:spcBef>
+              <a:spcAft>
+                <a:spcPts val="0"/>
+              </a:spcAft>
+              <a:buClr>
+                <a:schemeClr val="dk2"/>
+              </a:buClr>
+              <a:buSzPts val="1400"/>
+              <a:buChar char="●"/>
+            </a:pPr>
+            <a:r>
+              <a:rPr lang="en" sz="1400">
+                <a:solidFill>
+                  <a:schemeClr val="dk2"/>
+                </a:solidFill>
+              </a:rPr>
+              <a:t>How IoT and WSN have been integrated in the domain project.</a:t>
+            </a:r>
+            <a:endParaRPr sz="1400">
+              <a:solidFill>
+                <a:schemeClr val="dk2"/>
+              </a:solidFill>
+            </a:endParaRPr>
+          </a:p>
+          <a:p>
+            <a:pPr indent="-317500" lvl="0" marL="457200" rtl="0" algn="l">
+              <a:lnSpc>
+                <a:spcPct val="150000"/>
+              </a:lnSpc>
+              <a:spcBef>
+                <a:spcPts val="0"/>
+              </a:spcBef>
+              <a:spcAft>
+                <a:spcPts val="0"/>
+              </a:spcAft>
+              <a:buClr>
+                <a:schemeClr val="dk2"/>
+              </a:buClr>
+              <a:buSzPts val="1400"/>
+              <a:buChar char="●"/>
+            </a:pPr>
+            <a:r>
+              <a:rPr lang="en" sz="1400">
+                <a:solidFill>
+                  <a:schemeClr val="dk2"/>
+                </a:solidFill>
+              </a:rPr>
+              <a:t>How such sensors and actuators technologies have been used in our project.</a:t>
+            </a:r>
+            <a:endParaRPr sz="1400">
+              <a:solidFill>
+                <a:schemeClr val="dk2"/>
+              </a:solidFill>
+            </a:endParaRPr>
+          </a:p>
+          <a:p>
+            <a:pPr indent="-317500" lvl="0" marL="457200" rtl="0" algn="l">
+              <a:lnSpc>
+                <a:spcPct val="150000"/>
+              </a:lnSpc>
+              <a:spcBef>
+                <a:spcPts val="0"/>
+              </a:spcBef>
+              <a:spcAft>
+                <a:spcPts val="0"/>
+              </a:spcAft>
+              <a:buClr>
+                <a:schemeClr val="dk2"/>
+              </a:buClr>
+              <a:buSzPts val="1400"/>
+              <a:buChar char="●"/>
+            </a:pPr>
+            <a:r>
+              <a:rPr lang="en" sz="1400">
+                <a:solidFill>
+                  <a:schemeClr val="dk2"/>
+                </a:solidFill>
+              </a:rPr>
+              <a:t>How we can describe such a project using diagrams.</a:t>
+            </a:r>
+            <a:endParaRPr sz="1400">
+              <a:solidFill>
+                <a:schemeClr val="dk2"/>
+              </a:solidFill>
+            </a:endParaRPr>
+          </a:p>
+          <a:p>
+            <a:pPr indent="-317500" lvl="0" marL="457200" rtl="0" algn="l">
+              <a:lnSpc>
+                <a:spcPct val="150000"/>
+              </a:lnSpc>
+              <a:spcBef>
+                <a:spcPts val="0"/>
+              </a:spcBef>
+              <a:spcAft>
+                <a:spcPts val="0"/>
+              </a:spcAft>
+              <a:buClr>
+                <a:schemeClr val="dk2"/>
+              </a:buClr>
+              <a:buSzPts val="1400"/>
+              <a:buChar char="●"/>
+            </a:pPr>
+            <a:r>
+              <a:rPr lang="en" sz="1400">
+                <a:solidFill>
+                  <a:schemeClr val="dk2"/>
+                </a:solidFill>
+              </a:rPr>
+              <a:t>How MQTT </a:t>
+            </a:r>
+            <a:r>
+              <a:rPr lang="en" sz="1400">
+                <a:solidFill>
+                  <a:schemeClr val="dk2"/>
+                </a:solidFill>
+              </a:rPr>
+              <a:t>communication</a:t>
+            </a:r>
+            <a:r>
+              <a:rPr lang="en" sz="1400">
+                <a:solidFill>
+                  <a:schemeClr val="dk2"/>
+                </a:solidFill>
+              </a:rPr>
+              <a:t> protocol has been used in our project.</a:t>
+            </a:r>
+            <a:endParaRPr sz="1400">
+              <a:solidFill>
+                <a:schemeClr val="dk2"/>
+              </a:solidFill>
+            </a:endParaRPr>
+          </a:p>
+          <a:p>
+            <a:pPr indent="-317500" lvl="0" marL="457200" rtl="0" algn="l">
+              <a:lnSpc>
+                <a:spcPct val="150000"/>
+              </a:lnSpc>
+              <a:spcBef>
+                <a:spcPts val="0"/>
+              </a:spcBef>
+              <a:spcAft>
+                <a:spcPts val="0"/>
+              </a:spcAft>
+              <a:buClr>
+                <a:schemeClr val="dk2"/>
+              </a:buClr>
+              <a:buSzPts val="1400"/>
+              <a:buChar char="●"/>
+            </a:pPr>
+            <a:r>
+              <a:rPr lang="en" sz="1400">
+                <a:solidFill>
+                  <a:schemeClr val="dk2"/>
+                </a:solidFill>
+              </a:rPr>
+              <a:t>How we can establish communication between ESP32, Arduino and Raspberry Pi.</a:t>
+            </a:r>
+            <a:endParaRPr sz="1400">
+              <a:solidFill>
+                <a:schemeClr val="dk2"/>
+              </a:solidFill>
+            </a:endParaRPr>
+          </a:p>
+          <a:p>
+            <a:pPr indent="-317500" lvl="0" marL="457200" rtl="0" algn="l">
+              <a:lnSpc>
+                <a:spcPct val="150000"/>
+              </a:lnSpc>
+              <a:spcBef>
+                <a:spcPts val="0"/>
+              </a:spcBef>
+              <a:spcAft>
+                <a:spcPts val="0"/>
+              </a:spcAft>
+              <a:buClr>
+                <a:schemeClr val="dk2"/>
+              </a:buClr>
+              <a:buSzPts val="1400"/>
+              <a:buChar char="●"/>
+            </a:pPr>
+            <a:r>
+              <a:rPr lang="en" sz="1400">
+                <a:solidFill>
+                  <a:schemeClr val="dk2"/>
+                </a:solidFill>
+              </a:rPr>
+              <a:t>How we use different programming interfaces together for such a project. </a:t>
+            </a:r>
+            <a:endParaRPr sz="1400">
+              <a:solidFill>
+                <a:schemeClr val="dk2"/>
+              </a:solidFill>
+            </a:endParaRPr>
+          </a:p>
+        </p:txBody>
+      </p:sp>
+      <p:sp>
+        <p:nvSpPr>
+          <p:cNvPr id="295" name="Google Shape;295;p37"/>
+          <p:cNvSpPr txBox="1"/>
+          <p:nvPr>
+            <p:ph idx="12" type="sldNum"/>
+          </p:nvPr>
+        </p:nvSpPr>
+        <p:spPr>
+          <a:xfrm>
+            <a:off x="8536302" y="4749851"/>
+            <a:ext cx="548700" cy="393600"/>
+          </a:xfrm>
+          <a:prstGeom prst="rect">
+            <a:avLst/>
+          </a:prstGeom>
+        </p:spPr>
+        <p:txBody>
+          <a:bodyPr anchorCtr="0" anchor="ctr" bIns="91425" lIns="91425" spcFirstLastPara="1" rIns="91425" wrap="square" tIns="91425">
+            <a:normAutofit/>
+          </a:bodyPr>
+          <a:lstStyle/>
+          <a:p>
+            <a:pPr indent="0" lvl="0" marL="0" rtl="0" algn="r">
+              <a:spcBef>
+                <a:spcPts val="0"/>
+              </a:spcBef>
+              <a:spcAft>
+                <a:spcPts val="0"/>
+              </a:spcAft>
+              <a:buNone/>
+            </a:pPr>
+            <a:fld id="{00000000-1234-1234-1234-123412341234}" type="slidenum">
+              <a:rPr lang="en"/>
+              <a:t>‹#›</a:t>
+            </a:fld>
+            <a:endParaRPr/>
+          </a:p>
+        </p:txBody>
+      </p:sp>
+    </p:spTree>
+  </p:cSld>
+  <p:clrMapOvr>
+    <a:masterClrMapping/>
+  </p:clrMapOvr>
+</p:sld>
+</file>
+
+<file path=ppt/slides/slide26.xml><?xml version="1.0" encoding="utf-8"?>
+<p:sld xmlns:a="http://schemas.openxmlformats.org/drawingml/2006/main" xmlns:r="http://schemas.openxmlformats.org/officeDocument/2006/relationships" xmlns:mc="http://schemas.openxmlformats.org/markup-compatibility/2006" xmlns:mv="urn:schemas-microsoft-com:mac:vml" xmlns:p="http://schemas.openxmlformats.org/presentationml/2006/main" xmlns:c="http://schemas.openxmlformats.org/drawingml/2006/chart" xmlns:dgm="http://schemas.openxmlformats.org/drawingml/2006/diagram" xmlns:o="urn:schemas-microsoft-com:office:office" xmlns:v="urn:schemas-microsoft-com:vml" xmlns:pvml="urn:schemas-microsoft-com:office:powerpoint" xmlns:com="http://schemas.openxmlformats.org/drawingml/2006/compatibility" xmlns:p14="http://schemas.microsoft.com/office/powerpoint/2010/main" xmlns:p15="http://schemas.microsoft.com/office/powerpoint/2012/main" xmlns:ahyp="http://schemas.microsoft.com/office/drawing/2018/hyperlinkcolor">
+  <p:cSld>
+    <p:bg>
+      <p:bgPr>
+        <a:solidFill>
+          <a:schemeClr val="lt1"/>
+        </a:solidFill>
+      </p:bgPr>
+    </p:bg>
+    <p:spTree>
+      <p:nvGrpSpPr>
+        <p:cNvPr id="299" name="Shape 299"/>
+        <p:cNvGrpSpPr/>
+        <p:nvPr/>
+      </p:nvGrpSpPr>
+      <p:grpSpPr>
+        <a:xfrm>
+          <a:off x="0" y="0"/>
+          <a:ext cx="0" cy="0"/>
+          <a:chOff x="0" y="0"/>
+          <a:chExt cx="0" cy="0"/>
+        </a:xfrm>
+      </p:grpSpPr>
+      <p:sp>
+        <p:nvSpPr>
+          <p:cNvPr id="300" name="Google Shape;300;p38"/>
           <p:cNvSpPr txBox="1"/>
           <p:nvPr>
             <p:ph type="title"/>
@@ -13653,7 +14027,7 @@
       </p:sp>
       <p:sp>
         <p:nvSpPr>
-          <p:cNvPr id="293" name="Google Shape;293;p37"/>
+          <p:cNvPr id="301" name="Google Shape;301;p38"/>
           <p:cNvSpPr txBox="1"/>
           <p:nvPr>
             <p:ph idx="1" type="body"/>
@@ -14075,118 +14449,7 @@
       </p:sp>
       <p:sp>
         <p:nvSpPr>
-          <p:cNvPr id="294" name="Google Shape;294;p37"/>
-          <p:cNvSpPr txBox="1"/>
-          <p:nvPr>
-            <p:ph idx="12" type="sldNum"/>
-          </p:nvPr>
-        </p:nvSpPr>
-        <p:spPr>
-          <a:xfrm>
-            <a:off x="8536302" y="4749851"/>
-            <a:ext cx="548700" cy="393600"/>
-          </a:xfrm>
-          <a:prstGeom prst="rect">
-            <a:avLst/>
-          </a:prstGeom>
-        </p:spPr>
-        <p:txBody>
-          <a:bodyPr anchorCtr="0" anchor="ctr" bIns="91425" lIns="91425" spcFirstLastPara="1" rIns="91425" wrap="square" tIns="91425">
-            <a:normAutofit/>
-          </a:bodyPr>
-          <a:lstStyle/>
-          <a:p>
-            <a:pPr indent="0" lvl="0" marL="0" rtl="0" algn="r">
-              <a:spcBef>
-                <a:spcPts val="0"/>
-              </a:spcBef>
-              <a:spcAft>
-                <a:spcPts val="0"/>
-              </a:spcAft>
-              <a:buNone/>
-            </a:pPr>
-            <a:fld id="{00000000-1234-1234-1234-123412341234}" type="slidenum">
-              <a:rPr lang="en"/>
-              <a:t>‹#›</a:t>
-            </a:fld>
-            <a:endParaRPr/>
-          </a:p>
-        </p:txBody>
-      </p:sp>
-    </p:spTree>
-  </p:cSld>
-  <p:clrMapOvr>
-    <a:masterClrMapping/>
-  </p:clrMapOvr>
-</p:sld>
-</file>
-
-<file path=ppt/slides/slide26.xml><?xml version="1.0" encoding="utf-8"?>
-<p:sld xmlns:a="http://schemas.openxmlformats.org/drawingml/2006/main" xmlns:r="http://schemas.openxmlformats.org/officeDocument/2006/relationships" xmlns:mc="http://schemas.openxmlformats.org/markup-compatibility/2006" xmlns:mv="urn:schemas-microsoft-com:mac:vml" xmlns:p="http://schemas.openxmlformats.org/presentationml/2006/main" xmlns:c="http://schemas.openxmlformats.org/drawingml/2006/chart" xmlns:dgm="http://schemas.openxmlformats.org/drawingml/2006/diagram" xmlns:o="urn:schemas-microsoft-com:office:office" xmlns:v="urn:schemas-microsoft-com:vml" xmlns:pvml="urn:schemas-microsoft-com:office:powerpoint" xmlns:com="http://schemas.openxmlformats.org/drawingml/2006/compatibility" xmlns:p14="http://schemas.microsoft.com/office/powerpoint/2010/main" xmlns:p15="http://schemas.microsoft.com/office/powerpoint/2012/main" xmlns:ahyp="http://schemas.microsoft.com/office/drawing/2018/hyperlinkcolor">
-  <p:cSld>
-    <p:bg>
-      <p:bgPr>
-        <a:solidFill>
-          <a:schemeClr val="lt1"/>
-        </a:solidFill>
-      </p:bgPr>
-    </p:bg>
-    <p:spTree>
-      <p:nvGrpSpPr>
-        <p:cNvPr id="298" name="Shape 298"/>
-        <p:cNvGrpSpPr/>
-        <p:nvPr/>
-      </p:nvGrpSpPr>
-      <p:grpSpPr>
-        <a:xfrm>
-          <a:off x="0" y="0"/>
-          <a:ext cx="0" cy="0"/>
-          <a:chOff x="0" y="0"/>
-          <a:chExt cx="0" cy="0"/>
-        </a:xfrm>
-      </p:grpSpPr>
-      <p:sp>
-        <p:nvSpPr>
-          <p:cNvPr id="299" name="Google Shape;299;p38"/>
-          <p:cNvSpPr txBox="1"/>
-          <p:nvPr>
-            <p:ph idx="1" type="body"/>
-          </p:nvPr>
-        </p:nvSpPr>
-        <p:spPr>
-          <a:xfrm>
-            <a:off x="729450" y="2078875"/>
-            <a:ext cx="7688700" cy="2261100"/>
-          </a:xfrm>
-          <a:prstGeom prst="rect">
-            <a:avLst/>
-          </a:prstGeom>
-        </p:spPr>
-        <p:txBody>
-          <a:bodyPr anchorCtr="0" anchor="t" bIns="91425" lIns="91425" spcFirstLastPara="1" rIns="91425" wrap="square" tIns="91425">
-            <a:normAutofit/>
-          </a:bodyPr>
-          <a:lstStyle/>
-          <a:p>
-            <a:pPr indent="0" lvl="0" marL="0" rtl="0" algn="l">
-              <a:spcBef>
-                <a:spcPts val="0"/>
-              </a:spcBef>
-              <a:spcAft>
-                <a:spcPts val="1200"/>
-              </a:spcAft>
-              <a:buNone/>
-            </a:pPr>
-            <a:r>
-              <a:t/>
-            </a:r>
-            <a:endParaRPr/>
-          </a:p>
-        </p:txBody>
-      </p:sp>
-      <p:sp>
-        <p:nvSpPr>
-          <p:cNvPr id="300" name="Google Shape;300;p38"/>
+          <p:cNvPr id="302" name="Google Shape;302;p38"/>
           <p:cNvSpPr txBox="1"/>
           <p:nvPr>
             <p:ph idx="12" type="sldNum"/>
@@ -14244,7 +14507,7 @@
     </p:bg>
     <p:spTree>
       <p:nvGrpSpPr>
-        <p:cNvPr id="100" name="Shape 100"/>
+        <p:cNvPr id="101" name="Shape 101"/>
         <p:cNvGrpSpPr/>
         <p:nvPr/>
       </p:nvGrpSpPr>
@@ -14258,7 +14521,7 @@
       </p:grpSpPr>
       <p:sp>
         <p:nvSpPr>
-          <p:cNvPr id="101" name="Google Shape;101;p15"/>
+          <p:cNvPr id="102" name="Google Shape;102;p15"/>
           <p:cNvSpPr txBox="1"/>
           <p:nvPr>
             <p:ph type="ctrTitle"/>
@@ -14299,7 +14562,7 @@
       </p:sp>
       <p:sp>
         <p:nvSpPr>
-          <p:cNvPr id="102" name="Google Shape;102;p15"/>
+          <p:cNvPr id="103" name="Google Shape;103;p15"/>
           <p:cNvSpPr txBox="1"/>
           <p:nvPr>
             <p:ph idx="1" type="subTitle"/>
@@ -14338,7 +14601,7 @@
       </p:sp>
       <p:sp>
         <p:nvSpPr>
-          <p:cNvPr id="103" name="Google Shape;103;p15"/>
+          <p:cNvPr id="104" name="Google Shape;104;p15"/>
           <p:cNvSpPr txBox="1"/>
           <p:nvPr>
             <p:ph idx="12" type="sldNum"/>
@@ -14396,7 +14659,7 @@
     </p:bg>
     <p:spTree>
       <p:nvGrpSpPr>
-        <p:cNvPr id="107" name="Shape 107"/>
+        <p:cNvPr id="108" name="Shape 108"/>
         <p:cNvGrpSpPr/>
         <p:nvPr/>
       </p:nvGrpSpPr>
@@ -14410,7 +14673,7 @@
       </p:grpSpPr>
       <p:sp>
         <p:nvSpPr>
-          <p:cNvPr id="108" name="Google Shape;108;p16"/>
+          <p:cNvPr id="109" name="Google Shape;109;p16"/>
           <p:cNvSpPr txBox="1"/>
           <p:nvPr>
             <p:ph type="ctrTitle"/>
@@ -14450,7 +14713,7 @@
       </p:sp>
       <p:sp>
         <p:nvSpPr>
-          <p:cNvPr id="109" name="Google Shape;109;p16"/>
+          <p:cNvPr id="110" name="Google Shape;110;p16"/>
           <p:cNvSpPr txBox="1"/>
           <p:nvPr>
             <p:ph idx="12" type="sldNum"/>
@@ -14508,7 +14771,7 @@
     </p:bg>
     <p:spTree>
       <p:nvGrpSpPr>
-        <p:cNvPr id="113" name="Shape 113"/>
+        <p:cNvPr id="114" name="Shape 114"/>
         <p:cNvGrpSpPr/>
         <p:nvPr/>
       </p:nvGrpSpPr>
@@ -14522,7 +14785,7 @@
       </p:grpSpPr>
       <p:sp>
         <p:nvSpPr>
-          <p:cNvPr id="114" name="Google Shape;114;p17"/>
+          <p:cNvPr id="115" name="Google Shape;115;p17"/>
           <p:cNvSpPr/>
           <p:nvPr/>
         </p:nvSpPr>
@@ -14571,7 +14834,7 @@
       </p:sp>
       <p:sp>
         <p:nvSpPr>
-          <p:cNvPr id="115" name="Google Shape;115;p17"/>
+          <p:cNvPr id="116" name="Google Shape;116;p17"/>
           <p:cNvSpPr/>
           <p:nvPr/>
         </p:nvSpPr>
@@ -14620,7 +14883,7 @@
       </p:sp>
       <p:sp>
         <p:nvSpPr>
-          <p:cNvPr id="116" name="Google Shape;116;p17"/>
+          <p:cNvPr id="117" name="Google Shape;117;p17"/>
           <p:cNvSpPr/>
           <p:nvPr/>
         </p:nvSpPr>
@@ -14669,7 +14932,7 @@
       </p:sp>
       <p:pic>
         <p:nvPicPr>
-          <p:cNvPr id="117" name="Google Shape;117;p17"/>
+          <p:cNvPr id="118" name="Google Shape;118;p17"/>
           <p:cNvPicPr preferRelativeResize="0"/>
           <p:nvPr/>
         </p:nvPicPr>
@@ -14697,7 +14960,7 @@
       </p:pic>
       <p:pic>
         <p:nvPicPr>
-          <p:cNvPr id="118" name="Google Shape;118;p17"/>
+          <p:cNvPr id="119" name="Google Shape;119;p17"/>
           <p:cNvPicPr preferRelativeResize="0"/>
           <p:nvPr/>
         </p:nvPicPr>
@@ -14725,7 +14988,7 @@
       </p:pic>
       <p:pic>
         <p:nvPicPr>
-          <p:cNvPr id="119" name="Google Shape;119;p17"/>
+          <p:cNvPr id="120" name="Google Shape;120;p17"/>
           <p:cNvPicPr preferRelativeResize="0"/>
           <p:nvPr/>
         </p:nvPicPr>
@@ -14753,7 +15016,7 @@
       </p:pic>
       <p:sp>
         <p:nvSpPr>
-          <p:cNvPr id="120" name="Google Shape;120;p17"/>
+          <p:cNvPr id="121" name="Google Shape;121;p17"/>
           <p:cNvSpPr txBox="1"/>
           <p:nvPr>
             <p:ph type="title"/>
@@ -14793,7 +15056,7 @@
       </p:sp>
       <p:pic>
         <p:nvPicPr>
-          <p:cNvPr id="121" name="Google Shape;121;p17"/>
+          <p:cNvPr id="122" name="Google Shape;122;p17"/>
           <p:cNvPicPr preferRelativeResize="0"/>
           <p:nvPr/>
         </p:nvPicPr>
@@ -14821,7 +15084,7 @@
       </p:pic>
       <p:sp>
         <p:nvSpPr>
-          <p:cNvPr id="122" name="Google Shape;122;p17"/>
+          <p:cNvPr id="123" name="Google Shape;123;p17"/>
           <p:cNvSpPr txBox="1"/>
           <p:nvPr/>
         </p:nvSpPr>
@@ -14873,7 +15136,7 @@
       </p:sp>
       <p:pic>
         <p:nvPicPr>
-          <p:cNvPr id="123" name="Google Shape;123;p17"/>
+          <p:cNvPr id="124" name="Google Shape;124;p17"/>
           <p:cNvPicPr preferRelativeResize="0"/>
           <p:nvPr/>
         </p:nvPicPr>
@@ -14901,7 +15164,7 @@
       </p:pic>
       <p:sp>
         <p:nvSpPr>
-          <p:cNvPr id="124" name="Google Shape;124;p17"/>
+          <p:cNvPr id="125" name="Google Shape;125;p17"/>
           <p:cNvSpPr txBox="1"/>
           <p:nvPr/>
         </p:nvSpPr>
@@ -14953,7 +15216,7 @@
       </p:sp>
       <p:sp>
         <p:nvSpPr>
-          <p:cNvPr id="125" name="Google Shape;125;p17"/>
+          <p:cNvPr id="126" name="Google Shape;126;p17"/>
           <p:cNvSpPr txBox="1"/>
           <p:nvPr/>
         </p:nvSpPr>
@@ -15005,7 +15268,7 @@
       </p:sp>
       <p:sp>
         <p:nvSpPr>
-          <p:cNvPr id="126" name="Google Shape;126;p17"/>
+          <p:cNvPr id="127" name="Google Shape;127;p17"/>
           <p:cNvSpPr txBox="1"/>
           <p:nvPr/>
         </p:nvSpPr>
@@ -15057,7 +15320,7 @@
       </p:sp>
       <p:sp>
         <p:nvSpPr>
-          <p:cNvPr id="127" name="Google Shape;127;p17"/>
+          <p:cNvPr id="128" name="Google Shape;128;p17"/>
           <p:cNvSpPr txBox="1"/>
           <p:nvPr/>
         </p:nvSpPr>
@@ -15109,7 +15372,7 @@
       </p:sp>
       <p:sp>
         <p:nvSpPr>
-          <p:cNvPr id="128" name="Google Shape;128;p17"/>
+          <p:cNvPr id="129" name="Google Shape;129;p17"/>
           <p:cNvSpPr txBox="1"/>
           <p:nvPr/>
         </p:nvSpPr>
@@ -15161,7 +15424,7 @@
       </p:sp>
       <p:pic>
         <p:nvPicPr>
-          <p:cNvPr id="129" name="Google Shape;129;p17"/>
+          <p:cNvPr id="130" name="Google Shape;130;p17"/>
           <p:cNvPicPr preferRelativeResize="0"/>
           <p:nvPr/>
         </p:nvPicPr>
@@ -15189,7 +15452,7 @@
       </p:pic>
       <p:sp>
         <p:nvSpPr>
-          <p:cNvPr id="130" name="Google Shape;130;p17"/>
+          <p:cNvPr id="131" name="Google Shape;131;p17"/>
           <p:cNvSpPr txBox="1"/>
           <p:nvPr/>
         </p:nvSpPr>
@@ -15241,7 +15504,7 @@
       </p:sp>
       <p:sp>
         <p:nvSpPr>
-          <p:cNvPr id="131" name="Google Shape;131;p17"/>
+          <p:cNvPr id="132" name="Google Shape;132;p17"/>
           <p:cNvSpPr txBox="1"/>
           <p:nvPr/>
         </p:nvSpPr>
@@ -15293,7 +15556,7 @@
       </p:sp>
       <p:pic>
         <p:nvPicPr>
-          <p:cNvPr id="132" name="Google Shape;132;p17"/>
+          <p:cNvPr id="133" name="Google Shape;133;p17"/>
           <p:cNvPicPr preferRelativeResize="0"/>
           <p:nvPr/>
         </p:nvPicPr>
@@ -15320,7 +15583,7 @@
       </p:pic>
       <p:sp>
         <p:nvSpPr>
-          <p:cNvPr id="133" name="Google Shape;133;p17"/>
+          <p:cNvPr id="134" name="Google Shape;134;p17"/>
           <p:cNvSpPr txBox="1"/>
           <p:nvPr/>
         </p:nvSpPr>
@@ -15372,7 +15635,7 @@
       </p:sp>
       <p:sp>
         <p:nvSpPr>
-          <p:cNvPr id="134" name="Google Shape;134;p17"/>
+          <p:cNvPr id="135" name="Google Shape;135;p17"/>
           <p:cNvSpPr txBox="1"/>
           <p:nvPr/>
         </p:nvSpPr>
@@ -15424,7 +15687,7 @@
       </p:sp>
       <p:sp>
         <p:nvSpPr>
-          <p:cNvPr id="135" name="Google Shape;135;p17"/>
+          <p:cNvPr id="136" name="Google Shape;136;p17"/>
           <p:cNvSpPr txBox="1"/>
           <p:nvPr/>
         </p:nvSpPr>
@@ -15476,7 +15739,7 @@
       </p:sp>
       <p:sp>
         <p:nvSpPr>
-          <p:cNvPr id="136" name="Google Shape;136;p17"/>
+          <p:cNvPr id="137" name="Google Shape;137;p17"/>
           <p:cNvSpPr txBox="1"/>
           <p:nvPr>
             <p:ph idx="12" type="sldNum"/>
@@ -15534,7 +15797,7 @@
     </p:bg>
     <p:spTree>
       <p:nvGrpSpPr>
-        <p:cNvPr id="140" name="Shape 140"/>
+        <p:cNvPr id="141" name="Shape 141"/>
         <p:cNvGrpSpPr/>
         <p:nvPr/>
       </p:nvGrpSpPr>
@@ -15548,7 +15811,7 @@
       </p:grpSpPr>
       <p:sp>
         <p:nvSpPr>
-          <p:cNvPr id="141" name="Google Shape;141;p18"/>
+          <p:cNvPr id="142" name="Google Shape;142;p18"/>
           <p:cNvSpPr txBox="1"/>
           <p:nvPr>
             <p:ph type="title"/>
@@ -15588,7 +15851,7 @@
       </p:sp>
       <p:pic>
         <p:nvPicPr>
-          <p:cNvPr id="142" name="Google Shape;142;p18"/>
+          <p:cNvPr id="143" name="Google Shape;143;p18"/>
           <p:cNvPicPr preferRelativeResize="0"/>
           <p:nvPr/>
         </p:nvPicPr>
@@ -15615,7 +15878,7 @@
       </p:pic>
       <p:sp>
         <p:nvSpPr>
-          <p:cNvPr id="143" name="Google Shape;143;p18"/>
+          <p:cNvPr id="144" name="Google Shape;144;p18"/>
           <p:cNvSpPr txBox="1"/>
           <p:nvPr/>
         </p:nvSpPr>
@@ -15661,7 +15924,7 @@
       </p:sp>
       <p:sp>
         <p:nvSpPr>
-          <p:cNvPr id="144" name="Google Shape;144;p18"/>
+          <p:cNvPr id="145" name="Google Shape;145;p18"/>
           <p:cNvSpPr txBox="1"/>
           <p:nvPr>
             <p:ph idx="12" type="sldNum"/>
@@ -15719,7 +15982,7 @@
     </p:bg>
     <p:spTree>
       <p:nvGrpSpPr>
-        <p:cNvPr id="148" name="Shape 148"/>
+        <p:cNvPr id="149" name="Shape 149"/>
         <p:cNvGrpSpPr/>
         <p:nvPr/>
       </p:nvGrpSpPr>
@@ -15733,7 +15996,7 @@
       </p:grpSpPr>
       <p:sp>
         <p:nvSpPr>
-          <p:cNvPr id="149" name="Google Shape;149;p19"/>
+          <p:cNvPr id="150" name="Google Shape;150;p19"/>
           <p:cNvSpPr txBox="1"/>
           <p:nvPr>
             <p:ph type="ctrTitle"/>
@@ -15773,7 +16036,7 @@
       </p:sp>
       <p:sp>
         <p:nvSpPr>
-          <p:cNvPr id="150" name="Google Shape;150;p19"/>
+          <p:cNvPr id="151" name="Google Shape;151;p19"/>
           <p:cNvSpPr txBox="1"/>
           <p:nvPr>
             <p:ph idx="1" type="subTitle"/>
@@ -15812,7 +16075,7 @@
       </p:sp>
       <p:sp>
         <p:nvSpPr>
-          <p:cNvPr id="151" name="Google Shape;151;p19"/>
+          <p:cNvPr id="152" name="Google Shape;152;p19"/>
           <p:cNvSpPr txBox="1"/>
           <p:nvPr>
             <p:ph idx="12" type="sldNum"/>
@@ -15870,7 +16133,7 @@
     </p:bg>
     <p:spTree>
       <p:nvGrpSpPr>
-        <p:cNvPr id="155" name="Shape 155"/>
+        <p:cNvPr id="156" name="Shape 156"/>
         <p:cNvGrpSpPr/>
         <p:nvPr/>
       </p:nvGrpSpPr>
@@ -15884,7 +16147,7 @@
       </p:grpSpPr>
       <p:sp>
         <p:nvSpPr>
-          <p:cNvPr id="156" name="Google Shape;156;p20"/>
+          <p:cNvPr id="157" name="Google Shape;157;p20"/>
           <p:cNvSpPr txBox="1"/>
           <p:nvPr>
             <p:ph type="title"/>
@@ -15968,7 +16231,7 @@
       </p:sp>
       <p:sp>
         <p:nvSpPr>
-          <p:cNvPr id="157" name="Google Shape;157;p20"/>
+          <p:cNvPr id="158" name="Google Shape;158;p20"/>
           <p:cNvSpPr txBox="1"/>
           <p:nvPr>
             <p:ph idx="12" type="sldNum"/>
@@ -16008,7 +16271,7 @@
       </p:sp>
       <p:pic>
         <p:nvPicPr>
-          <p:cNvPr id="158" name="Google Shape;158;p20"/>
+          <p:cNvPr id="159" name="Google Shape;159;p20"/>
           <p:cNvPicPr preferRelativeResize="0"/>
           <p:nvPr/>
         </p:nvPicPr>
@@ -16036,7 +16299,7 @@
       </p:pic>
       <p:pic>
         <p:nvPicPr>
-          <p:cNvPr id="159" name="Google Shape;159;p20"/>
+          <p:cNvPr id="160" name="Google Shape;160;p20"/>
           <p:cNvPicPr preferRelativeResize="0"/>
           <p:nvPr/>
         </p:nvPicPr>
@@ -16082,7 +16345,7 @@
     </p:bg>
     <p:spTree>
       <p:nvGrpSpPr>
-        <p:cNvPr id="163" name="Shape 163"/>
+        <p:cNvPr id="164" name="Shape 164"/>
         <p:cNvGrpSpPr/>
         <p:nvPr/>
       </p:nvGrpSpPr>
@@ -16096,7 +16359,7 @@
       </p:grpSpPr>
       <p:sp>
         <p:nvSpPr>
-          <p:cNvPr id="164" name="Google Shape;164;p21"/>
+          <p:cNvPr id="165" name="Google Shape;165;p21"/>
           <p:cNvSpPr txBox="1"/>
           <p:nvPr>
             <p:ph type="title"/>
@@ -16181,7 +16444,7 @@
       </p:sp>
       <p:sp>
         <p:nvSpPr>
-          <p:cNvPr id="165" name="Google Shape;165;p21"/>
+          <p:cNvPr id="166" name="Google Shape;166;p21"/>
           <p:cNvSpPr txBox="1"/>
           <p:nvPr>
             <p:ph idx="12" type="sldNum"/>
@@ -16221,7 +16484,7 @@
       </p:sp>
       <p:pic>
         <p:nvPicPr>
-          <p:cNvPr id="166" name="Google Shape;166;p21"/>
+          <p:cNvPr id="167" name="Google Shape;167;p21"/>
           <p:cNvPicPr preferRelativeResize="0"/>
           <p:nvPr/>
         </p:nvPicPr>
@@ -16249,7 +16512,7 @@
       </p:pic>
       <p:pic>
         <p:nvPicPr>
-          <p:cNvPr id="167" name="Google Shape;167;p21"/>
+          <p:cNvPr id="168" name="Google Shape;168;p21"/>
           <p:cNvPicPr preferRelativeResize="0"/>
           <p:nvPr/>
         </p:nvPicPr>
@@ -16277,7 +16540,7 @@
       </p:pic>
       <p:pic>
         <p:nvPicPr>
-          <p:cNvPr id="168" name="Google Shape;168;p21"/>
+          <p:cNvPr id="169" name="Google Shape;169;p21"/>
           <p:cNvPicPr preferRelativeResize="0"/>
           <p:nvPr/>
         </p:nvPicPr>
@@ -16312,6 +16575,285 @@
 </file>
 
 <file path=ppt/theme/theme1.xml><?xml version="1.0" encoding="utf-8"?>
+<a:theme xmlns:a="http://schemas.openxmlformats.org/drawingml/2006/main" xmlns:r="http://schemas.openxmlformats.org/officeDocument/2006/relationships" name="Streamline">
+  <a:themeElements>
+    <a:clrScheme name="Streamline">
+      <a:dk1>
+        <a:srgbClr val="1A9988"/>
+      </a:dk1>
+      <a:lt1>
+        <a:srgbClr val="FFFFFF"/>
+      </a:lt1>
+      <a:dk2>
+        <a:srgbClr val="1A1A1A"/>
+      </a:dk2>
+      <a:lt2>
+        <a:srgbClr val="E9EDEE"/>
+      </a:lt2>
+      <a:accent1>
+        <a:srgbClr val="595959"/>
+      </a:accent1>
+      <a:accent2>
+        <a:srgbClr val="6AA4C8"/>
+      </a:accent2>
+      <a:accent3>
+        <a:srgbClr val="EB5600"/>
+      </a:accent3>
+      <a:accent4>
+        <a:srgbClr val="A2FFE8"/>
+      </a:accent4>
+      <a:accent5>
+        <a:srgbClr val="1C3678"/>
+      </a:accent5>
+      <a:accent6>
+        <a:srgbClr val="FFB8A2"/>
+      </a:accent6>
+      <a:hlink>
+        <a:srgbClr val="1C3678"/>
+      </a:hlink>
+      <a:folHlink>
+        <a:srgbClr val="1C3678"/>
+      </a:folHlink>
+    </a:clrScheme>
+    <a:fontScheme name="Office">
+      <a:majorFont>
+        <a:latin typeface="Arial"/>
+        <a:ea typeface=""/>
+        <a:cs typeface=""/>
+        <a:font script="Jpan" typeface="ＭＳ Ｐゴシック"/>
+        <a:font script="Hang" typeface="맑은 고딕"/>
+        <a:font script="Hans" typeface="宋体"/>
+        <a:font script="Hant" typeface="新細明體"/>
+        <a:font script="Arab" typeface="Times New Roman"/>
+        <a:font script="Hebr" typeface="Times New Roman"/>
+        <a:font script="Thai" typeface="Angsana New"/>
+        <a:font script="Ethi" typeface="Nyala"/>
+        <a:font script="Beng" typeface="Vrinda"/>
+        <a:font script="Gujr" typeface="Shruti"/>
+        <a:font script="Khmr" typeface="MoolBoran"/>
+        <a:font script="Knda" typeface="Tunga"/>
+        <a:font script="Guru" typeface="Raavi"/>
+        <a:font script="Cans" typeface="Euphemia"/>
+        <a:font script="Cher" typeface="Plantagenet Cherokee"/>
+        <a:font script="Yiii" typeface="Microsoft Yi Baiti"/>
+        <a:font script="Tibt" typeface="Microsoft Himalaya"/>
+        <a:font script="Thaa" typeface="MV Boli"/>
+        <a:font script="Deva" typeface="Mangal"/>
+        <a:font script="Telu" typeface="Gautami"/>
+        <a:font script="Taml" typeface="Latha"/>
+        <a:font script="Syrc" typeface="Estrangelo Edessa"/>
+        <a:font script="Orya" typeface="Kalinga"/>
+        <a:font script="Mlym" typeface="Kartika"/>
+        <a:font script="Laoo" typeface="DokChampa"/>
+        <a:font script="Sinh" typeface="Iskoola Pota"/>
+        <a:font script="Mong" typeface="Mongolian Baiti"/>
+        <a:font script="Viet" typeface="Times New Roman"/>
+        <a:font script="Uigh" typeface="Microsoft Uighur"/>
+        <a:font script="Geor" typeface="Sylfaen"/>
+      </a:majorFont>
+      <a:minorFont>
+        <a:latin typeface="Arial"/>
+        <a:ea typeface=""/>
+        <a:cs typeface=""/>
+        <a:font script="Jpan" typeface="ＭＳ Ｐゴシック"/>
+        <a:font script="Hang" typeface="맑은 고딕"/>
+        <a:font script="Hans" typeface="宋体"/>
+        <a:font script="Hant" typeface="新細明體"/>
+        <a:font script="Arab" typeface="Arial"/>
+        <a:font script="Hebr" typeface="Arial"/>
+        <a:font script="Thai" typeface="Cordia New"/>
+        <a:font script="Ethi" typeface="Nyala"/>
+        <a:font script="Beng" typeface="Vrinda"/>
+        <a:font script="Gujr" typeface="Shruti"/>
+        <a:font script="Khmr" typeface="DaunPenh"/>
+        <a:font script="Knda" typeface="Tunga"/>
+        <a:font script="Guru" typeface="Raavi"/>
+        <a:font script="Cans" typeface="Euphemia"/>
+        <a:font script="Cher" typeface="Plantagenet Cherokee"/>
+        <a:font script="Yiii" typeface="Microsoft Yi Baiti"/>
+        <a:font script="Tibt" typeface="Microsoft Himalaya"/>
+        <a:font script="Thaa" typeface="MV Boli"/>
+        <a:font script="Deva" typeface="Mangal"/>
+        <a:font script="Telu" typeface="Gautami"/>
+        <a:font script="Taml" typeface="Latha"/>
+        <a:font script="Syrc" typeface="Estrangelo Edessa"/>
+        <a:font script="Orya" typeface="Kalinga"/>
+        <a:font script="Mlym" typeface="Kartika"/>
+        <a:font script="Laoo" typeface="DokChampa"/>
+        <a:font script="Sinh" typeface="Iskoola Pota"/>
+        <a:font script="Mong" typeface="Mongolian Baiti"/>
+        <a:font script="Viet" typeface="Arial"/>
+        <a:font script="Uigh" typeface="Microsoft Uighur"/>
+        <a:font script="Geor" typeface="Sylfaen"/>
+      </a:minorFont>
+    </a:fontScheme>
+    <a:fmtScheme name="Office">
+      <a:fillStyleLst>
+        <a:solidFill>
+          <a:schemeClr val="phClr"/>
+        </a:solidFill>
+        <a:gradFill rotWithShape="1">
+          <a:gsLst>
+            <a:gs pos="0">
+              <a:schemeClr val="phClr">
+                <a:tint val="50000"/>
+                <a:satMod val="300000"/>
+              </a:schemeClr>
+            </a:gs>
+            <a:gs pos="35000">
+              <a:schemeClr val="phClr">
+                <a:tint val="37000"/>
+                <a:satMod val="300000"/>
+              </a:schemeClr>
+            </a:gs>
+            <a:gs pos="100000">
+              <a:schemeClr val="phClr">
+                <a:tint val="15000"/>
+                <a:satMod val="350000"/>
+              </a:schemeClr>
+            </a:gs>
+          </a:gsLst>
+          <a:lin ang="16200000" scaled="1"/>
+        </a:gradFill>
+        <a:gradFill rotWithShape="1">
+          <a:gsLst>
+            <a:gs pos="0">
+              <a:schemeClr val="phClr">
+                <a:tint val="100000"/>
+                <a:shade val="100000"/>
+                <a:satMod val="130000"/>
+              </a:schemeClr>
+            </a:gs>
+            <a:gs pos="100000">
+              <a:schemeClr val="phClr">
+                <a:tint val="50000"/>
+                <a:shade val="100000"/>
+                <a:satMod val="350000"/>
+              </a:schemeClr>
+            </a:gs>
+          </a:gsLst>
+          <a:lin ang="16200000" scaled="0"/>
+        </a:gradFill>
+      </a:fillStyleLst>
+      <a:lnStyleLst>
+        <a:ln w="9525" cap="flat" cmpd="sng" algn="ctr">
+          <a:solidFill>
+            <a:schemeClr val="phClr">
+              <a:shade val="95000"/>
+              <a:satMod val="105000"/>
+            </a:schemeClr>
+          </a:solidFill>
+          <a:prstDash val="solid"/>
+        </a:ln>
+        <a:ln w="25400" cap="flat" cmpd="sng" algn="ctr">
+          <a:solidFill>
+            <a:schemeClr val="phClr"/>
+          </a:solidFill>
+          <a:prstDash val="solid"/>
+        </a:ln>
+        <a:ln w="38100" cap="flat" cmpd="sng" algn="ctr">
+          <a:solidFill>
+            <a:schemeClr val="phClr"/>
+          </a:solidFill>
+          <a:prstDash val="solid"/>
+        </a:ln>
+      </a:lnStyleLst>
+      <a:effectStyleLst>
+        <a:effectStyle>
+          <a:effectLst>
+            <a:outerShdw blurRad="40000" dist="20000" dir="5400000" rotWithShape="0">
+              <a:srgbClr val="000000">
+                <a:alpha val="38000"/>
+              </a:srgbClr>
+            </a:outerShdw>
+          </a:effectLst>
+        </a:effectStyle>
+        <a:effectStyle>
+          <a:effectLst>
+            <a:outerShdw blurRad="40000" dist="23000" dir="5400000" rotWithShape="0">
+              <a:srgbClr val="000000">
+                <a:alpha val="35000"/>
+              </a:srgbClr>
+            </a:outerShdw>
+          </a:effectLst>
+        </a:effectStyle>
+        <a:effectStyle>
+          <a:effectLst>
+            <a:outerShdw blurRad="40000" dist="23000" dir="5400000" rotWithShape="0">
+              <a:srgbClr val="000000">
+                <a:alpha val="35000"/>
+              </a:srgbClr>
+            </a:outerShdw>
+          </a:effectLst>
+          <a:scene3d>
+            <a:camera prst="orthographicFront">
+              <a:rot lat="0" lon="0" rev="0"/>
+            </a:camera>
+            <a:lightRig rig="threePt" dir="t">
+              <a:rot lat="0" lon="0" rev="1200000"/>
+            </a:lightRig>
+          </a:scene3d>
+          <a:sp3d>
+            <a:bevelT w="63500" h="25400"/>
+          </a:sp3d>
+        </a:effectStyle>
+      </a:effectStyleLst>
+      <a:bgFillStyleLst>
+        <a:solidFill>
+          <a:schemeClr val="phClr"/>
+        </a:solidFill>
+        <a:gradFill rotWithShape="1">
+          <a:gsLst>
+            <a:gs pos="0">
+              <a:schemeClr val="phClr">
+                <a:tint val="40000"/>
+                <a:satMod val="350000"/>
+              </a:schemeClr>
+            </a:gs>
+            <a:gs pos="40000">
+              <a:schemeClr val="phClr">
+                <a:tint val="45000"/>
+                <a:shade val="99000"/>
+                <a:satMod val="350000"/>
+              </a:schemeClr>
+            </a:gs>
+            <a:gs pos="100000">
+              <a:schemeClr val="phClr">
+                <a:shade val="20000"/>
+                <a:satMod val="255000"/>
+              </a:schemeClr>
+            </a:gs>
+          </a:gsLst>
+          <a:path path="circle">
+            <a:fillToRect l="50000" t="-80000" r="50000" b="180000"/>
+          </a:path>
+        </a:gradFill>
+        <a:gradFill rotWithShape="1">
+          <a:gsLst>
+            <a:gs pos="0">
+              <a:schemeClr val="phClr">
+                <a:tint val="80000"/>
+                <a:satMod val="300000"/>
+              </a:schemeClr>
+            </a:gs>
+            <a:gs pos="100000">
+              <a:schemeClr val="phClr">
+                <a:shade val="30000"/>
+                <a:satMod val="200000"/>
+              </a:schemeClr>
+            </a:gs>
+          </a:gsLst>
+          <a:path path="circle">
+            <a:fillToRect l="50000" t="50000" r="50000" b="50000"/>
+          </a:path>
+        </a:gradFill>
+      </a:bgFillStyleLst>
+    </a:fmtScheme>
+  </a:themeElements>
+</a:theme>
+</file>
+
+<file path=ppt/theme/theme2.xml><?xml version="1.0" encoding="utf-8"?>
 <a:theme xmlns:a="http://schemas.openxmlformats.org/drawingml/2006/main" xmlns:r="http://schemas.openxmlformats.org/officeDocument/2006/relationships">
   <a:themeElements>
     <a:clrScheme name="Default">
@@ -16588,283 +17130,4 @@
     </a:fmtScheme>
   </a:themeElements>
 </a:theme>
-</file>
-
-<file path=ppt/theme/theme2.xml><?xml version="1.0" encoding="utf-8"?>
-<a:theme xmlns:a="http://schemas.openxmlformats.org/drawingml/2006/main" xmlns:r="http://schemas.openxmlformats.org/officeDocument/2006/relationships" name="Streamline">
-  <a:themeElements>
-    <a:clrScheme name="Streamline">
-      <a:dk1>
-        <a:srgbClr val="1A9988"/>
-      </a:dk1>
-      <a:lt1>
-        <a:srgbClr val="FFFFFF"/>
-      </a:lt1>
-      <a:dk2>
-        <a:srgbClr val="1A1A1A"/>
-      </a:dk2>
-      <a:lt2>
-        <a:srgbClr val="E9EDEE"/>
-      </a:lt2>
-      <a:accent1>
-        <a:srgbClr val="595959"/>
-      </a:accent1>
-      <a:accent2>
-        <a:srgbClr val="6AA4C8"/>
-      </a:accent2>
-      <a:accent3>
-        <a:srgbClr val="EB5600"/>
-      </a:accent3>
-      <a:accent4>
-        <a:srgbClr val="A2FFE8"/>
-      </a:accent4>
-      <a:accent5>
-        <a:srgbClr val="1C3678"/>
-      </a:accent5>
-      <a:accent6>
-        <a:srgbClr val="FFB8A2"/>
-      </a:accent6>
-      <a:hlink>
-        <a:srgbClr val="1C3678"/>
-      </a:hlink>
-      <a:folHlink>
-        <a:srgbClr val="1C3678"/>
-      </a:folHlink>
-    </a:clrScheme>
-    <a:fontScheme name="Office">
-      <a:majorFont>
-        <a:latin typeface="Arial"/>
-        <a:ea typeface=""/>
-        <a:cs typeface=""/>
-        <a:font script="Jpan" typeface="ＭＳ Ｐゴシック"/>
-        <a:font script="Hang" typeface="맑은 고딕"/>
-        <a:font script="Hans" typeface="宋体"/>
-        <a:font script="Hant" typeface="新細明體"/>
-        <a:font script="Arab" typeface="Times New Roman"/>
-        <a:font script="Hebr" typeface="Times New Roman"/>
-        <a:font script="Thai" typeface="Angsana New"/>
-        <a:font script="Ethi" typeface="Nyala"/>
-        <a:font script="Beng" typeface="Vrinda"/>
-        <a:font script="Gujr" typeface="Shruti"/>
-        <a:font script="Khmr" typeface="MoolBoran"/>
-        <a:font script="Knda" typeface="Tunga"/>
-        <a:font script="Guru" typeface="Raavi"/>
-        <a:font script="Cans" typeface="Euphemia"/>
-        <a:font script="Cher" typeface="Plantagenet Cherokee"/>
-        <a:font script="Yiii" typeface="Microsoft Yi Baiti"/>
-        <a:font script="Tibt" typeface="Microsoft Himalaya"/>
-        <a:font script="Thaa" typeface="MV Boli"/>
-        <a:font script="Deva" typeface="Mangal"/>
-        <a:font script="Telu" typeface="Gautami"/>
-        <a:font script="Taml" typeface="Latha"/>
-        <a:font script="Syrc" typeface="Estrangelo Edessa"/>
-        <a:font script="Orya" typeface="Kalinga"/>
-        <a:font script="Mlym" typeface="Kartika"/>
-        <a:font script="Laoo" typeface="DokChampa"/>
-        <a:font script="Sinh" typeface="Iskoola Pota"/>
-        <a:font script="Mong" typeface="Mongolian Baiti"/>
-        <a:font script="Viet" typeface="Times New Roman"/>
-        <a:font script="Uigh" typeface="Microsoft Uighur"/>
-        <a:font script="Geor" typeface="Sylfaen"/>
-      </a:majorFont>
-      <a:minorFont>
-        <a:latin typeface="Arial"/>
-        <a:ea typeface=""/>
-        <a:cs typeface=""/>
-        <a:font script="Jpan" typeface="ＭＳ Ｐゴシック"/>
-        <a:font script="Hang" typeface="맑은 고딕"/>
-        <a:font script="Hans" typeface="宋体"/>
-        <a:font script="Hant" typeface="新細明體"/>
-        <a:font script="Arab" typeface="Arial"/>
-        <a:font script="Hebr" typeface="Arial"/>
-        <a:font script="Thai" typeface="Cordia New"/>
-        <a:font script="Ethi" typeface="Nyala"/>
-        <a:font script="Beng" typeface="Vrinda"/>
-        <a:font script="Gujr" typeface="Shruti"/>
-        <a:font script="Khmr" typeface="DaunPenh"/>
-        <a:font script="Knda" typeface="Tunga"/>
-        <a:font script="Guru" typeface="Raavi"/>
-        <a:font script="Cans" typeface="Euphemia"/>
-        <a:font script="Cher" typeface="Plantagenet Cherokee"/>
-        <a:font script="Yiii" typeface="Microsoft Yi Baiti"/>
-        <a:font script="Tibt" typeface="Microsoft Himalaya"/>
-        <a:font script="Thaa" typeface="MV Boli"/>
-        <a:font script="Deva" typeface="Mangal"/>
-        <a:font script="Telu" typeface="Gautami"/>
-        <a:font script="Taml" typeface="Latha"/>
-        <a:font script="Syrc" typeface="Estrangelo Edessa"/>
-        <a:font script="Orya" typeface="Kalinga"/>
-        <a:font script="Mlym" typeface="Kartika"/>
-        <a:font script="Laoo" typeface="DokChampa"/>
-        <a:font script="Sinh" typeface="Iskoola Pota"/>
-        <a:font script="Mong" typeface="Mongolian Baiti"/>
-        <a:font script="Viet" typeface="Arial"/>
-        <a:font script="Uigh" typeface="Microsoft Uighur"/>
-        <a:font script="Geor" typeface="Sylfaen"/>
-      </a:minorFont>
-    </a:fontScheme>
-    <a:fmtScheme name="Office">
-      <a:fillStyleLst>
-        <a:solidFill>
-          <a:schemeClr val="phClr"/>
-        </a:solidFill>
-        <a:gradFill rotWithShape="1">
-          <a:gsLst>
-            <a:gs pos="0">
-              <a:schemeClr val="phClr">
-                <a:tint val="50000"/>
-                <a:satMod val="300000"/>
-              </a:schemeClr>
-            </a:gs>
-            <a:gs pos="35000">
-              <a:schemeClr val="phClr">
-                <a:tint val="37000"/>
-                <a:satMod val="300000"/>
-              </a:schemeClr>
-            </a:gs>
-            <a:gs pos="100000">
-              <a:schemeClr val="phClr">
-                <a:tint val="15000"/>
-                <a:satMod val="350000"/>
-              </a:schemeClr>
-            </a:gs>
-          </a:gsLst>
-          <a:lin ang="16200000" scaled="1"/>
-        </a:gradFill>
-        <a:gradFill rotWithShape="1">
-          <a:gsLst>
-            <a:gs pos="0">
-              <a:schemeClr val="phClr">
-                <a:tint val="100000"/>
-                <a:shade val="100000"/>
-                <a:satMod val="130000"/>
-              </a:schemeClr>
-            </a:gs>
-            <a:gs pos="100000">
-              <a:schemeClr val="phClr">
-                <a:tint val="50000"/>
-                <a:shade val="100000"/>
-                <a:satMod val="350000"/>
-              </a:schemeClr>
-            </a:gs>
-          </a:gsLst>
-          <a:lin ang="16200000" scaled="0"/>
-        </a:gradFill>
-      </a:fillStyleLst>
-      <a:lnStyleLst>
-        <a:ln w="9525" cap="flat" cmpd="sng" algn="ctr">
-          <a:solidFill>
-            <a:schemeClr val="phClr">
-              <a:shade val="95000"/>
-              <a:satMod val="105000"/>
-            </a:schemeClr>
-          </a:solidFill>
-          <a:prstDash val="solid"/>
-        </a:ln>
-        <a:ln w="25400" cap="flat" cmpd="sng" algn="ctr">
-          <a:solidFill>
-            <a:schemeClr val="phClr"/>
-          </a:solidFill>
-          <a:prstDash val="solid"/>
-        </a:ln>
-        <a:ln w="38100" cap="flat" cmpd="sng" algn="ctr">
-          <a:solidFill>
-            <a:schemeClr val="phClr"/>
-          </a:solidFill>
-          <a:prstDash val="solid"/>
-        </a:ln>
-      </a:lnStyleLst>
-      <a:effectStyleLst>
-        <a:effectStyle>
-          <a:effectLst>
-            <a:outerShdw blurRad="40000" dist="20000" dir="5400000" rotWithShape="0">
-              <a:srgbClr val="000000">
-                <a:alpha val="38000"/>
-              </a:srgbClr>
-            </a:outerShdw>
-          </a:effectLst>
-        </a:effectStyle>
-        <a:effectStyle>
-          <a:effectLst>
-            <a:outerShdw blurRad="40000" dist="23000" dir="5400000" rotWithShape="0">
-              <a:srgbClr val="000000">
-                <a:alpha val="35000"/>
-              </a:srgbClr>
-            </a:outerShdw>
-          </a:effectLst>
-        </a:effectStyle>
-        <a:effectStyle>
-          <a:effectLst>
-            <a:outerShdw blurRad="40000" dist="23000" dir="5400000" rotWithShape="0">
-              <a:srgbClr val="000000">
-                <a:alpha val="35000"/>
-              </a:srgbClr>
-            </a:outerShdw>
-          </a:effectLst>
-          <a:scene3d>
-            <a:camera prst="orthographicFront">
-              <a:rot lat="0" lon="0" rev="0"/>
-            </a:camera>
-            <a:lightRig rig="threePt" dir="t">
-              <a:rot lat="0" lon="0" rev="1200000"/>
-            </a:lightRig>
-          </a:scene3d>
-          <a:sp3d>
-            <a:bevelT w="63500" h="25400"/>
-          </a:sp3d>
-        </a:effectStyle>
-      </a:effectStyleLst>
-      <a:bgFillStyleLst>
-        <a:solidFill>
-          <a:schemeClr val="phClr"/>
-        </a:solidFill>
-        <a:gradFill rotWithShape="1">
-          <a:gsLst>
-            <a:gs pos="0">
-              <a:schemeClr val="phClr">
-                <a:tint val="40000"/>
-                <a:satMod val="350000"/>
-              </a:schemeClr>
-            </a:gs>
-            <a:gs pos="40000">
-              <a:schemeClr val="phClr">
-                <a:tint val="45000"/>
-                <a:shade val="99000"/>
-                <a:satMod val="350000"/>
-              </a:schemeClr>
-            </a:gs>
-            <a:gs pos="100000">
-              <a:schemeClr val="phClr">
-                <a:shade val="20000"/>
-                <a:satMod val="255000"/>
-              </a:schemeClr>
-            </a:gs>
-          </a:gsLst>
-          <a:path path="circle">
-            <a:fillToRect l="50000" t="-80000" r="50000" b="180000"/>
-          </a:path>
-        </a:gradFill>
-        <a:gradFill rotWithShape="1">
-          <a:gsLst>
-            <a:gs pos="0">
-              <a:schemeClr val="phClr">
-                <a:tint val="80000"/>
-                <a:satMod val="300000"/>
-              </a:schemeClr>
-            </a:gs>
-            <a:gs pos="100000">
-              <a:schemeClr val="phClr">
-                <a:shade val="30000"/>
-                <a:satMod val="200000"/>
-              </a:schemeClr>
-            </a:gs>
-          </a:gsLst>
-          <a:path path="circle">
-            <a:fillToRect l="50000" t="50000" r="50000" b="50000"/>
-          </a:path>
-        </a:gradFill>
-      </a:bgFillStyleLst>
-    </a:fmtScheme>
-  </a:themeElements>
-</a:theme>
 </file>
</xml_diff>